<commit_message>
updated the ponderation strategy to match ISO 25010 and not my projects attributes
</commit_message>
<xml_diff>
--- a/Project/Context/tastebud.context.pptx
+++ b/Project/Context/tastebud.context.pptx
@@ -14199,23 +14199,23 @@
           <p:nvPr/>
         </p:nvGraphicFramePr>
         <p:xfrm>
-          <a:off x="673243" y="1028700"/>
-          <a:ext cx="16941515" cy="8862569"/>
+          <a:off x="731366" y="1028700"/>
+          <a:ext cx="16825268" cy="9001125"/>
         </p:xfrm>
         <a:graphic>
           <a:graphicData uri="http://schemas.openxmlformats.org/drawingml/2006/table">
             <a:tbl>
               <a:tblPr/>
               <a:tblGrid>
-                <a:gridCol w="2826880"/>
-                <a:gridCol w="5878317"/>
-                <a:gridCol w="2090909"/>
-                <a:gridCol w="981184"/>
-                <a:gridCol w="1213975"/>
-                <a:gridCol w="1885279"/>
-                <a:gridCol w="2064971"/>
+                <a:gridCol w="1744274"/>
+                <a:gridCol w="5980731"/>
+                <a:gridCol w="3729178"/>
+                <a:gridCol w="962868"/>
+                <a:gridCol w="1105849"/>
+                <a:gridCol w="1427168"/>
+                <a:gridCol w="1875199"/>
               </a:tblGrid>
-              <a:tr h="1040461">
+              <a:tr h="1021337">
                 <a:tc>
                   <a:txBody>
                     <a:bodyPr anchor="t" rtlCol="false"/>
@@ -14242,7 +14242,7 @@
                       <a:endParaRPr lang="en-US" sz="1100"/>
                     </a:p>
                   </a:txBody>
-                  <a:tcPr marL="76200" marR="76200" marT="76200" marB="76200" anchor="ctr">
+                  <a:tcPr marL="66675" marR="66675" marT="66675" marB="66675" anchor="ctr">
                     <a:lnL cmpd="sng" algn="ctr" cap="flat" w="19050">
                       <a:solidFill>
                         <a:srgbClr val="000000"/>
@@ -14310,7 +14310,7 @@
                       <a:endParaRPr lang="en-US" sz="1100"/>
                     </a:p>
                   </a:txBody>
-                  <a:tcPr marL="76200" marR="76200" marT="76200" marB="76200" anchor="ctr">
+                  <a:tcPr marL="66675" marR="66675" marT="66675" marB="66675" anchor="ctr">
                     <a:lnL cmpd="sng" algn="ctr" cap="flat" w="19050">
                       <a:solidFill>
                         <a:srgbClr val="000000"/>
@@ -14378,7 +14378,7 @@
                       <a:endParaRPr lang="en-US" sz="1100"/>
                     </a:p>
                   </a:txBody>
-                  <a:tcPr marL="76200" marR="76200" marT="76200" marB="76200" anchor="ctr">
+                  <a:tcPr marL="66675" marR="66675" marT="66675" marB="66675" anchor="ctr">
                     <a:lnL cmpd="sng" algn="ctr" cap="flat" w="19050">
                       <a:solidFill>
                         <a:srgbClr val="000000"/>
@@ -14446,7 +14446,7 @@
                       <a:endParaRPr lang="en-US" sz="1100"/>
                     </a:p>
                   </a:txBody>
-                  <a:tcPr marL="76200" marR="76200" marT="76200" marB="76200" anchor="ctr">
+                  <a:tcPr marL="66675" marR="66675" marT="66675" marB="66675" anchor="ctr">
                     <a:lnL cmpd="sng" algn="ctr" cap="flat" w="19050">
                       <a:solidFill>
                         <a:srgbClr val="000000"/>
@@ -14514,7 +14514,7 @@
                       <a:endParaRPr lang="en-US" sz="1100"/>
                     </a:p>
                   </a:txBody>
-                  <a:tcPr marL="76200" marR="76200" marT="76200" marB="76200" anchor="ctr">
+                  <a:tcPr marL="66675" marR="66675" marT="66675" marB="66675" anchor="ctr">
                     <a:lnL cmpd="sng" algn="ctr" cap="flat" w="19050">
                       <a:solidFill>
                         <a:srgbClr val="000000"/>
@@ -14582,7 +14582,7 @@
                       <a:endParaRPr lang="en-US" sz="1100"/>
                     </a:p>
                   </a:txBody>
-                  <a:tcPr marL="76200" marR="76200" marT="76200" marB="76200" anchor="ctr">
+                  <a:tcPr marL="66675" marR="66675" marT="66675" marB="66675" anchor="ctr">
                     <a:lnL cmpd="sng" algn="ctr" cap="flat" w="19050">
                       <a:solidFill>
                         <a:srgbClr val="000000"/>
@@ -14645,15 +14645,65 @@
                           <a:cs typeface="Agrandir Bold"/>
                           <a:sym typeface="Agrandir Bold"/>
                         </a:rPr>
-                        <a:t>Value = (Impact +</a:t>
+                        <a:t>Value = (Impact + Difficulty) × Weight</a:t>
                       </a:r>
                       <a:endParaRPr lang="en-US" sz="1100"/>
                     </a:p>
+                  </a:txBody>
+                  <a:tcPr marL="66675" marR="66675" marT="66675" marB="66675" anchor="ctr">
+                    <a:lnL cmpd="sng" algn="ctr" cap="flat" w="19050">
+                      <a:solidFill>
+                        <a:srgbClr val="000000"/>
+                      </a:solidFill>
+                      <a:prstDash val="solid"/>
+                      <a:round/>
+                      <a:headEnd type="none" w="med" len="med"/>
+                      <a:tailEnd type="none" w="med" len="med"/>
+                    </a:lnL>
+                    <a:lnR cmpd="sng" algn="ctr" cap="flat" w="19050">
+                      <a:solidFill>
+                        <a:srgbClr val="000000"/>
+                      </a:solidFill>
+                      <a:prstDash val="solid"/>
+                      <a:round/>
+                      <a:headEnd type="none" w="med" len="med"/>
+                      <a:tailEnd type="none" w="med" len="med"/>
+                    </a:lnR>
+                    <a:lnT cmpd="sng" algn="ctr" cap="flat" w="19050">
+                      <a:solidFill>
+                        <a:srgbClr val="000000"/>
+                      </a:solidFill>
+                      <a:prstDash val="solid"/>
+                      <a:round/>
+                      <a:headEnd type="none" w="med" len="med"/>
+                      <a:tailEnd type="none" w="med" len="med"/>
+                    </a:lnT>
+                    <a:lnB cmpd="sng" algn="ctr" cap="flat" w="19050">
+                      <a:solidFill>
+                        <a:srgbClr val="000000"/>
+                      </a:solidFill>
+                      <a:prstDash val="solid"/>
+                      <a:round/>
+                      <a:headEnd type="none" w="med" len="med"/>
+                      <a:tailEnd type="none" w="med" len="med"/>
+                    </a:lnB>
+                    <a:solidFill>
+                      <a:srgbClr val="F1E3E3"/>
+                    </a:solidFill>
+                  </a:tcPr>
+                </a:tc>
+              </a:tr>
+              <a:tr h="1298147">
+                <a:tc>
+                  <a:txBody>
+                    <a:bodyPr anchor="t" rtlCol="false"/>
+                    <a:lstStyle/>
                     <a:p>
                       <a:pPr algn="l">
                         <a:lnSpc>
                           <a:spcPts val="2227"/>
                         </a:lnSpc>
+                        <a:defRPr/>
                       </a:pPr>
                       <a:r>
                         <a:rPr lang="en-US" sz="1591" b="true">
@@ -14665,81 +14715,12 @@
                           <a:cs typeface="Agrandir Bold"/>
                           <a:sym typeface="Agrandir Bold"/>
                         </a:rPr>
-                        <a:t>  Difficulty) × Weight</a:t>
-                      </a:r>
-                    </a:p>
-                  </a:txBody>
-                  <a:tcPr marL="76200" marR="76200" marT="76200" marB="76200" anchor="ctr">
-                    <a:lnL cmpd="sng" algn="ctr" cap="flat" w="19050">
-                      <a:solidFill>
-                        <a:srgbClr val="000000"/>
-                      </a:solidFill>
-                      <a:prstDash val="solid"/>
-                      <a:round/>
-                      <a:headEnd type="none" w="med" len="med"/>
-                      <a:tailEnd type="none" w="med" len="med"/>
-                    </a:lnL>
-                    <a:lnR cmpd="sng" algn="ctr" cap="flat" w="19050">
-                      <a:solidFill>
-                        <a:srgbClr val="000000"/>
-                      </a:solidFill>
-                      <a:prstDash val="solid"/>
-                      <a:round/>
-                      <a:headEnd type="none" w="med" len="med"/>
-                      <a:tailEnd type="none" w="med" len="med"/>
-                    </a:lnR>
-                    <a:lnT cmpd="sng" algn="ctr" cap="flat" w="19050">
-                      <a:solidFill>
-                        <a:srgbClr val="000000"/>
-                      </a:solidFill>
-                      <a:prstDash val="solid"/>
-                      <a:round/>
-                      <a:headEnd type="none" w="med" len="med"/>
-                      <a:tailEnd type="none" w="med" len="med"/>
-                    </a:lnT>
-                    <a:lnB cmpd="sng" algn="ctr" cap="flat" w="19050">
-                      <a:solidFill>
-                        <a:srgbClr val="000000"/>
-                      </a:solidFill>
-                      <a:prstDash val="solid"/>
-                      <a:round/>
-                      <a:headEnd type="none" w="med" len="med"/>
-                      <a:tailEnd type="none" w="med" len="med"/>
-                    </a:lnB>
-                    <a:solidFill>
-                      <a:srgbClr val="F1E3E3"/>
-                    </a:solidFill>
-                  </a:tcPr>
-                </a:tc>
-              </a:tr>
-              <a:tr h="1317281">
-                <a:tc>
-                  <a:txBody>
-                    <a:bodyPr anchor="t" rtlCol="false"/>
-                    <a:lstStyle/>
-                    <a:p>
-                      <a:pPr algn="l">
-                        <a:lnSpc>
-                          <a:spcPts val="2227"/>
-                        </a:lnSpc>
-                        <a:defRPr/>
-                      </a:pPr>
-                      <a:r>
-                        <a:rPr lang="en-US" sz="1591" b="true">
-                          <a:solidFill>
-                            <a:srgbClr val="000000"/>
-                          </a:solidFill>
-                          <a:latin typeface="Agrandir Bold"/>
-                          <a:ea typeface="Agrandir Bold"/>
-                          <a:cs typeface="Agrandir Bold"/>
-                          <a:sym typeface="Agrandir Bold"/>
-                        </a:rPr>
-                        <a:t>Recommendation Accuracy</a:t>
+                        <a:t>Liability</a:t>
                       </a:r>
                       <a:endParaRPr lang="en-US" sz="1100"/>
                     </a:p>
                   </a:txBody>
-                  <a:tcPr marL="76200" marR="76200" marT="76200" marB="76200" anchor="ctr">
+                  <a:tcPr marL="66675" marR="66675" marT="66675" marB="66675" anchor="ctr">
                     <a:lnL cmpd="sng" algn="ctr" cap="flat" w="19050">
                       <a:solidFill>
                         <a:srgbClr val="000000"/>
@@ -14802,12 +14783,12 @@
                           <a:cs typeface="Agrandir"/>
                           <a:sym typeface="Agrandir"/>
                         </a:rPr>
-                        <a:t>Measures the quality and relevance of the recommendations by evaluating how well they align with the users preferences.</a:t>
+                        <a:t>Ability of the system to address accountability concerns—e.g., handling user data appropriately, mitigating legal/ethical risks, and clarifying responsibilities if the recommendation leads to unintended outcomes.</a:t>
                       </a:r>
                       <a:endParaRPr lang="en-US" sz="1100"/>
                     </a:p>
                   </a:txBody>
-                  <a:tcPr marL="76200" marR="76200" marT="76200" marB="76200" anchor="ctr">
+                  <a:tcPr marL="66675" marR="66675" marT="66675" marB="66675" anchor="ctr">
                     <a:lnL cmpd="sng" algn="ctr" cap="flat" w="19050">
                       <a:solidFill>
                         <a:srgbClr val="000000"/>
@@ -14870,15 +14851,63 @@
                           <a:cs typeface="Agrandir"/>
                           <a:sym typeface="Agrandir"/>
                         </a:rPr>
-                        <a:t>Precision@K and NDCG values meeting set</a:t>
+                        <a:t>- Number of liability-related incidents- Compliance score with relevant guidelines (privacy, disclaimers)</a:t>
                       </a:r>
                       <a:endParaRPr lang="en-US" sz="1100"/>
                     </a:p>
+                  </a:txBody>
+                  <a:tcPr marL="66675" marR="66675" marT="66675" marB="66675" anchor="ctr">
+                    <a:lnL cmpd="sng" algn="ctr" cap="flat" w="19050">
+                      <a:solidFill>
+                        <a:srgbClr val="000000"/>
+                      </a:solidFill>
+                      <a:prstDash val="solid"/>
+                      <a:round/>
+                      <a:headEnd type="none" w="med" len="med"/>
+                      <a:tailEnd type="none" w="med" len="med"/>
+                    </a:lnL>
+                    <a:lnR cmpd="sng" algn="ctr" cap="flat" w="19050">
+                      <a:solidFill>
+                        <a:srgbClr val="000000"/>
+                      </a:solidFill>
+                      <a:prstDash val="solid"/>
+                      <a:round/>
+                      <a:headEnd type="none" w="med" len="med"/>
+                      <a:tailEnd type="none" w="med" len="med"/>
+                    </a:lnR>
+                    <a:lnT cmpd="sng" algn="ctr" cap="flat" w="19050">
+                      <a:solidFill>
+                        <a:srgbClr val="000000"/>
+                      </a:solidFill>
+                      <a:prstDash val="solid"/>
+                      <a:round/>
+                      <a:headEnd type="none" w="med" len="med"/>
+                      <a:tailEnd type="none" w="med" len="med"/>
+                    </a:lnT>
+                    <a:lnB cmpd="sng" algn="ctr" cap="flat" w="19050">
+                      <a:solidFill>
+                        <a:srgbClr val="000000"/>
+                      </a:solidFill>
+                      <a:prstDash val="solid"/>
+                      <a:round/>
+                      <a:headEnd type="none" w="med" len="med"/>
+                      <a:tailEnd type="none" w="med" len="med"/>
+                    </a:lnB>
+                    <a:solidFill>
+                      <a:srgbClr val="FFFFFF"/>
+                    </a:solidFill>
+                  </a:tcPr>
+                </a:tc>
+                <a:tc>
+                  <a:txBody>
+                    <a:bodyPr anchor="t" rtlCol="false"/>
+                    <a:lstStyle/>
                     <a:p>
                       <a:pPr algn="l">
                         <a:lnSpc>
                           <a:spcPts val="2227"/>
                         </a:lnSpc>
+                        <a:defRPr/>
                       </a:pPr>
                       <a:r>
                         <a:rPr lang="en-US" sz="1591">
@@ -14890,11 +14919,12 @@
                           <a:cs typeface="Agrandir"/>
                           <a:sym typeface="Agrandir"/>
                         </a:rPr>
-                        <a:t>  thresholds</a:t>
+                        <a:t>2</a:t>
                       </a:r>
+                      <a:endParaRPr lang="en-US" sz="1100"/>
                     </a:p>
                   </a:txBody>
-                  <a:tcPr marL="76200" marR="76200" marT="76200" marB="76200" anchor="ctr">
+                  <a:tcPr marL="66675" marR="66675" marT="66675" marB="66675" anchor="ctr">
                     <a:lnL cmpd="sng" algn="ctr" cap="flat" w="19050">
                       <a:solidFill>
                         <a:srgbClr val="000000"/>
@@ -14941,7 +14971,7 @@
                     <a:bodyPr anchor="t" rtlCol="false"/>
                     <a:lstStyle/>
                     <a:p>
-                      <a:pPr algn="ctr">
+                      <a:pPr algn="l">
                         <a:lnSpc>
                           <a:spcPts val="2227"/>
                         </a:lnSpc>
@@ -14962,7 +14992,7 @@
                       <a:endParaRPr lang="en-US" sz="1100"/>
                     </a:p>
                   </a:txBody>
-                  <a:tcPr marL="76200" marR="76200" marT="76200" marB="76200" anchor="ctr">
+                  <a:tcPr marL="66675" marR="66675" marT="66675" marB="66675" anchor="ctr">
                     <a:lnL cmpd="sng" algn="ctr" cap="flat" w="19050">
                       <a:solidFill>
                         <a:srgbClr val="000000"/>
@@ -15009,7 +15039,919 @@
                     <a:bodyPr anchor="t" rtlCol="false"/>
                     <a:lstStyle/>
                     <a:p>
-                      <a:pPr algn="ctr">
+                      <a:pPr algn="l">
+                        <a:lnSpc>
+                          <a:spcPts val="2227"/>
+                        </a:lnSpc>
+                        <a:defRPr/>
+                      </a:pPr>
+                      <a:r>
+                        <a:rPr lang="en-US" sz="1591">
+                          <a:solidFill>
+                            <a:srgbClr val="000000"/>
+                          </a:solidFill>
+                          <a:latin typeface="Agrandir"/>
+                          <a:ea typeface="Agrandir"/>
+                          <a:cs typeface="Agrandir"/>
+                          <a:sym typeface="Agrandir"/>
+                        </a:rPr>
+                        <a:t>10</a:t>
+                      </a:r>
+                      <a:endParaRPr lang="en-US" sz="1100"/>
+                    </a:p>
+                  </a:txBody>
+                  <a:tcPr marL="66675" marR="66675" marT="66675" marB="66675" anchor="ctr">
+                    <a:lnL cmpd="sng" algn="ctr" cap="flat" w="19050">
+                      <a:solidFill>
+                        <a:srgbClr val="000000"/>
+                      </a:solidFill>
+                      <a:prstDash val="solid"/>
+                      <a:round/>
+                      <a:headEnd type="none" w="med" len="med"/>
+                      <a:tailEnd type="none" w="med" len="med"/>
+                    </a:lnL>
+                    <a:lnR cmpd="sng" algn="ctr" cap="flat" w="19050">
+                      <a:solidFill>
+                        <a:srgbClr val="000000"/>
+                      </a:solidFill>
+                      <a:prstDash val="solid"/>
+                      <a:round/>
+                      <a:headEnd type="none" w="med" len="med"/>
+                      <a:tailEnd type="none" w="med" len="med"/>
+                    </a:lnR>
+                    <a:lnT cmpd="sng" algn="ctr" cap="flat" w="19050">
+                      <a:solidFill>
+                        <a:srgbClr val="000000"/>
+                      </a:solidFill>
+                      <a:prstDash val="solid"/>
+                      <a:round/>
+                      <a:headEnd type="none" w="med" len="med"/>
+                      <a:tailEnd type="none" w="med" len="med"/>
+                    </a:lnT>
+                    <a:lnB cmpd="sng" algn="ctr" cap="flat" w="19050">
+                      <a:solidFill>
+                        <a:srgbClr val="000000"/>
+                      </a:solidFill>
+                      <a:prstDash val="solid"/>
+                      <a:round/>
+                      <a:headEnd type="none" w="med" len="med"/>
+                      <a:tailEnd type="none" w="med" len="med"/>
+                    </a:lnB>
+                    <a:solidFill>
+                      <a:srgbClr val="FFFFFF"/>
+                    </a:solidFill>
+                  </a:tcPr>
+                </a:tc>
+                <a:tc>
+                  <a:txBody>
+                    <a:bodyPr anchor="t" rtlCol="false"/>
+                    <a:lstStyle/>
+                    <a:p>
+                      <a:pPr algn="l">
+                        <a:lnSpc>
+                          <a:spcPts val="2227"/>
+                        </a:lnSpc>
+                        <a:defRPr/>
+                      </a:pPr>
+                      <a:r>
+                        <a:rPr lang="en-US" sz="1591">
+                          <a:solidFill>
+                            <a:srgbClr val="000000"/>
+                          </a:solidFill>
+                          <a:latin typeface="Agrandir"/>
+                          <a:ea typeface="Agrandir"/>
+                          <a:cs typeface="Agrandir"/>
+                          <a:sym typeface="Agrandir"/>
+                        </a:rPr>
+                        <a:t>(2 + 3) × 10 = </a:t>
+                      </a:r>
+                      <a:r>
+                        <a:rPr lang="en-US" sz="1591" b="true">
+                          <a:solidFill>
+                            <a:srgbClr val="000000"/>
+                          </a:solidFill>
+                          <a:latin typeface="Agrandir Bold"/>
+                          <a:ea typeface="Agrandir Bold"/>
+                          <a:cs typeface="Agrandir Bold"/>
+                          <a:sym typeface="Agrandir Bold"/>
+                        </a:rPr>
+                        <a:t>50</a:t>
+                      </a:r>
+                      <a:endParaRPr lang="en-US" sz="1100"/>
+                    </a:p>
+                  </a:txBody>
+                  <a:tcPr marL="66675" marR="66675" marT="66675" marB="66675" anchor="ctr">
+                    <a:lnL cmpd="sng" algn="ctr" cap="flat" w="19050">
+                      <a:solidFill>
+                        <a:srgbClr val="000000"/>
+                      </a:solidFill>
+                      <a:prstDash val="solid"/>
+                      <a:round/>
+                      <a:headEnd type="none" w="med" len="med"/>
+                      <a:tailEnd type="none" w="med" len="med"/>
+                    </a:lnL>
+                    <a:lnR cmpd="sng" algn="ctr" cap="flat" w="19050">
+                      <a:solidFill>
+                        <a:srgbClr val="000000"/>
+                      </a:solidFill>
+                      <a:prstDash val="solid"/>
+                      <a:round/>
+                      <a:headEnd type="none" w="med" len="med"/>
+                      <a:tailEnd type="none" w="med" len="med"/>
+                    </a:lnR>
+                    <a:lnT cmpd="sng" algn="ctr" cap="flat" w="19050">
+                      <a:solidFill>
+                        <a:srgbClr val="000000"/>
+                      </a:solidFill>
+                      <a:prstDash val="solid"/>
+                      <a:round/>
+                      <a:headEnd type="none" w="med" len="med"/>
+                      <a:tailEnd type="none" w="med" len="med"/>
+                    </a:lnT>
+                    <a:lnB cmpd="sng" algn="ctr" cap="flat" w="19050">
+                      <a:solidFill>
+                        <a:srgbClr val="000000"/>
+                      </a:solidFill>
+                      <a:prstDash val="solid"/>
+                      <a:round/>
+                      <a:headEnd type="none" w="med" len="med"/>
+                      <a:tailEnd type="none" w="med" len="med"/>
+                    </a:lnB>
+                    <a:solidFill>
+                      <a:srgbClr val="FFFFFF"/>
+                    </a:solidFill>
+                  </a:tcPr>
+                </a:tc>
+              </a:tr>
+              <a:tr h="1021337">
+                <a:tc>
+                  <a:txBody>
+                    <a:bodyPr anchor="t" rtlCol="false"/>
+                    <a:lstStyle/>
+                    <a:p>
+                      <a:pPr algn="l">
+                        <a:lnSpc>
+                          <a:spcPts val="2227"/>
+                        </a:lnSpc>
+                        <a:defRPr/>
+                      </a:pPr>
+                      <a:r>
+                        <a:rPr lang="en-US" sz="1591" b="true">
+                          <a:solidFill>
+                            <a:srgbClr val="000000"/>
+                          </a:solidFill>
+                          <a:latin typeface="Agrandir Bold"/>
+                          <a:ea typeface="Agrandir Bold"/>
+                          <a:cs typeface="Agrandir Bold"/>
+                          <a:sym typeface="Agrandir Bold"/>
+                        </a:rPr>
+                        <a:t>Security</a:t>
+                      </a:r>
+                      <a:endParaRPr lang="en-US" sz="1100"/>
+                    </a:p>
+                  </a:txBody>
+                  <a:tcPr marL="66675" marR="66675" marT="66675" marB="66675" anchor="ctr">
+                    <a:lnL cmpd="sng" algn="ctr" cap="flat" w="19050">
+                      <a:solidFill>
+                        <a:srgbClr val="000000"/>
+                      </a:solidFill>
+                      <a:prstDash val="solid"/>
+                      <a:round/>
+                      <a:headEnd type="none" w="med" len="med"/>
+                      <a:tailEnd type="none" w="med" len="med"/>
+                    </a:lnL>
+                    <a:lnR cmpd="sng" algn="ctr" cap="flat" w="19050">
+                      <a:solidFill>
+                        <a:srgbClr val="000000"/>
+                      </a:solidFill>
+                      <a:prstDash val="solid"/>
+                      <a:round/>
+                      <a:headEnd type="none" w="med" len="med"/>
+                      <a:tailEnd type="none" w="med" len="med"/>
+                    </a:lnR>
+                    <a:lnT cmpd="sng" algn="ctr" cap="flat" w="19050">
+                      <a:solidFill>
+                        <a:srgbClr val="000000"/>
+                      </a:solidFill>
+                      <a:prstDash val="solid"/>
+                      <a:round/>
+                      <a:headEnd type="none" w="med" len="med"/>
+                      <a:tailEnd type="none" w="med" len="med"/>
+                    </a:lnT>
+                    <a:lnB cmpd="sng" algn="ctr" cap="flat" w="19050">
+                      <a:solidFill>
+                        <a:srgbClr val="000000"/>
+                      </a:solidFill>
+                      <a:prstDash val="solid"/>
+                      <a:round/>
+                      <a:headEnd type="none" w="med" len="med"/>
+                      <a:tailEnd type="none" w="med" len="med"/>
+                    </a:lnB>
+                    <a:solidFill>
+                      <a:srgbClr val="F1E3E3"/>
+                    </a:solidFill>
+                  </a:tcPr>
+                </a:tc>
+                <a:tc>
+                  <a:txBody>
+                    <a:bodyPr anchor="t" rtlCol="false"/>
+                    <a:lstStyle/>
+                    <a:p>
+                      <a:pPr algn="l">
+                        <a:lnSpc>
+                          <a:spcPts val="2227"/>
+                        </a:lnSpc>
+                        <a:defRPr/>
+                      </a:pPr>
+                      <a:r>
+                        <a:rPr lang="en-US" sz="1591">
+                          <a:solidFill>
+                            <a:srgbClr val="000000"/>
+                          </a:solidFill>
+                          <a:latin typeface="Agrandir"/>
+                          <a:ea typeface="Agrandir"/>
+                          <a:cs typeface="Agrandir"/>
+                          <a:sym typeface="Agrandir"/>
+                        </a:rPr>
+                        <a:t>Ensures that data (user profiles, transaction info) is protected against unauthorized access or breaches, safeguarding both personal and business-critical information.</a:t>
+                      </a:r>
+                      <a:endParaRPr lang="en-US" sz="1100"/>
+                    </a:p>
+                  </a:txBody>
+                  <a:tcPr marL="66675" marR="66675" marT="66675" marB="66675" anchor="ctr">
+                    <a:lnL cmpd="sng" algn="ctr" cap="flat" w="19050">
+                      <a:solidFill>
+                        <a:srgbClr val="000000"/>
+                      </a:solidFill>
+                      <a:prstDash val="solid"/>
+                      <a:round/>
+                      <a:headEnd type="none" w="med" len="med"/>
+                      <a:tailEnd type="none" w="med" len="med"/>
+                    </a:lnL>
+                    <a:lnR cmpd="sng" algn="ctr" cap="flat" w="19050">
+                      <a:solidFill>
+                        <a:srgbClr val="000000"/>
+                      </a:solidFill>
+                      <a:prstDash val="solid"/>
+                      <a:round/>
+                      <a:headEnd type="none" w="med" len="med"/>
+                      <a:tailEnd type="none" w="med" len="med"/>
+                    </a:lnR>
+                    <a:lnT cmpd="sng" algn="ctr" cap="flat" w="19050">
+                      <a:solidFill>
+                        <a:srgbClr val="000000"/>
+                      </a:solidFill>
+                      <a:prstDash val="solid"/>
+                      <a:round/>
+                      <a:headEnd type="none" w="med" len="med"/>
+                      <a:tailEnd type="none" w="med" len="med"/>
+                    </a:lnT>
+                    <a:lnB cmpd="sng" algn="ctr" cap="flat" w="19050">
+                      <a:solidFill>
+                        <a:srgbClr val="000000"/>
+                      </a:solidFill>
+                      <a:prstDash val="solid"/>
+                      <a:round/>
+                      <a:headEnd type="none" w="med" len="med"/>
+                      <a:tailEnd type="none" w="med" len="med"/>
+                    </a:lnB>
+                    <a:solidFill>
+                      <a:srgbClr val="FFFFFF"/>
+                    </a:solidFill>
+                  </a:tcPr>
+                </a:tc>
+                <a:tc>
+                  <a:txBody>
+                    <a:bodyPr anchor="t" rtlCol="false"/>
+                    <a:lstStyle/>
+                    <a:p>
+                      <a:pPr algn="l">
+                        <a:lnSpc>
+                          <a:spcPts val="2227"/>
+                        </a:lnSpc>
+                        <a:defRPr/>
+                      </a:pPr>
+                      <a:r>
+                        <a:rPr lang="en-US" sz="1591">
+                          <a:solidFill>
+                            <a:srgbClr val="000000"/>
+                          </a:solidFill>
+                          <a:latin typeface="Agrandir"/>
+                          <a:ea typeface="Agrandir"/>
+                          <a:cs typeface="Agrandir"/>
+                          <a:sym typeface="Agrandir"/>
+                        </a:rPr>
+                        <a:t>- Number of security vulnerabilities found- Percentage of encrypted data in transit and at rest</a:t>
+                      </a:r>
+                      <a:endParaRPr lang="en-US" sz="1100"/>
+                    </a:p>
+                  </a:txBody>
+                  <a:tcPr marL="66675" marR="66675" marT="66675" marB="66675" anchor="ctr">
+                    <a:lnL cmpd="sng" algn="ctr" cap="flat" w="19050">
+                      <a:solidFill>
+                        <a:srgbClr val="000000"/>
+                      </a:solidFill>
+                      <a:prstDash val="solid"/>
+                      <a:round/>
+                      <a:headEnd type="none" w="med" len="med"/>
+                      <a:tailEnd type="none" w="med" len="med"/>
+                    </a:lnL>
+                    <a:lnR cmpd="sng" algn="ctr" cap="flat" w="19050">
+                      <a:solidFill>
+                        <a:srgbClr val="000000"/>
+                      </a:solidFill>
+                      <a:prstDash val="solid"/>
+                      <a:round/>
+                      <a:headEnd type="none" w="med" len="med"/>
+                      <a:tailEnd type="none" w="med" len="med"/>
+                    </a:lnR>
+                    <a:lnT cmpd="sng" algn="ctr" cap="flat" w="19050">
+                      <a:solidFill>
+                        <a:srgbClr val="000000"/>
+                      </a:solidFill>
+                      <a:prstDash val="solid"/>
+                      <a:round/>
+                      <a:headEnd type="none" w="med" len="med"/>
+                      <a:tailEnd type="none" w="med" len="med"/>
+                    </a:lnT>
+                    <a:lnB cmpd="sng" algn="ctr" cap="flat" w="19050">
+                      <a:solidFill>
+                        <a:srgbClr val="000000"/>
+                      </a:solidFill>
+                      <a:prstDash val="solid"/>
+                      <a:round/>
+                      <a:headEnd type="none" w="med" len="med"/>
+                      <a:tailEnd type="none" w="med" len="med"/>
+                    </a:lnB>
+                    <a:solidFill>
+                      <a:srgbClr val="FFFFFF"/>
+                    </a:solidFill>
+                  </a:tcPr>
+                </a:tc>
+                <a:tc>
+                  <a:txBody>
+                    <a:bodyPr anchor="t" rtlCol="false"/>
+                    <a:lstStyle/>
+                    <a:p>
+                      <a:pPr algn="l">
+                        <a:lnSpc>
+                          <a:spcPts val="2227"/>
+                        </a:lnSpc>
+                        <a:defRPr/>
+                      </a:pPr>
+                      <a:r>
+                        <a:rPr lang="en-US" sz="1591">
+                          <a:solidFill>
+                            <a:srgbClr val="000000"/>
+                          </a:solidFill>
+                          <a:latin typeface="Agrandir"/>
+                          <a:ea typeface="Agrandir"/>
+                          <a:cs typeface="Agrandir"/>
+                          <a:sym typeface="Agrandir"/>
+                        </a:rPr>
+                        <a:t>3</a:t>
+                      </a:r>
+                      <a:endParaRPr lang="en-US" sz="1100"/>
+                    </a:p>
+                  </a:txBody>
+                  <a:tcPr marL="66675" marR="66675" marT="66675" marB="66675" anchor="ctr">
+                    <a:lnL cmpd="sng" algn="ctr" cap="flat" w="19050">
+                      <a:solidFill>
+                        <a:srgbClr val="000000"/>
+                      </a:solidFill>
+                      <a:prstDash val="solid"/>
+                      <a:round/>
+                      <a:headEnd type="none" w="med" len="med"/>
+                      <a:tailEnd type="none" w="med" len="med"/>
+                    </a:lnL>
+                    <a:lnR cmpd="sng" algn="ctr" cap="flat" w="19050">
+                      <a:solidFill>
+                        <a:srgbClr val="000000"/>
+                      </a:solidFill>
+                      <a:prstDash val="solid"/>
+                      <a:round/>
+                      <a:headEnd type="none" w="med" len="med"/>
+                      <a:tailEnd type="none" w="med" len="med"/>
+                    </a:lnR>
+                    <a:lnT cmpd="sng" algn="ctr" cap="flat" w="19050">
+                      <a:solidFill>
+                        <a:srgbClr val="000000"/>
+                      </a:solidFill>
+                      <a:prstDash val="solid"/>
+                      <a:round/>
+                      <a:headEnd type="none" w="med" len="med"/>
+                      <a:tailEnd type="none" w="med" len="med"/>
+                    </a:lnT>
+                    <a:lnB cmpd="sng" algn="ctr" cap="flat" w="19050">
+                      <a:solidFill>
+                        <a:srgbClr val="000000"/>
+                      </a:solidFill>
+                      <a:prstDash val="solid"/>
+                      <a:round/>
+                      <a:headEnd type="none" w="med" len="med"/>
+                      <a:tailEnd type="none" w="med" len="med"/>
+                    </a:lnB>
+                    <a:solidFill>
+                      <a:srgbClr val="FFFFFF"/>
+                    </a:solidFill>
+                  </a:tcPr>
+                </a:tc>
+                <a:tc>
+                  <a:txBody>
+                    <a:bodyPr anchor="t" rtlCol="false"/>
+                    <a:lstStyle/>
+                    <a:p>
+                      <a:pPr algn="l">
+                        <a:lnSpc>
+                          <a:spcPts val="2227"/>
+                        </a:lnSpc>
+                        <a:defRPr/>
+                      </a:pPr>
+                      <a:r>
+                        <a:rPr lang="en-US" sz="1591">
+                          <a:solidFill>
+                            <a:srgbClr val="000000"/>
+                          </a:solidFill>
+                          <a:latin typeface="Agrandir"/>
+                          <a:ea typeface="Agrandir"/>
+                          <a:cs typeface="Agrandir"/>
+                          <a:sym typeface="Agrandir"/>
+                        </a:rPr>
+                        <a:t>3</a:t>
+                      </a:r>
+                      <a:endParaRPr lang="en-US" sz="1100"/>
+                    </a:p>
+                  </a:txBody>
+                  <a:tcPr marL="66675" marR="66675" marT="66675" marB="66675" anchor="ctr">
+                    <a:lnL cmpd="sng" algn="ctr" cap="flat" w="19050">
+                      <a:solidFill>
+                        <a:srgbClr val="000000"/>
+                      </a:solidFill>
+                      <a:prstDash val="solid"/>
+                      <a:round/>
+                      <a:headEnd type="none" w="med" len="med"/>
+                      <a:tailEnd type="none" w="med" len="med"/>
+                    </a:lnL>
+                    <a:lnR cmpd="sng" algn="ctr" cap="flat" w="19050">
+                      <a:solidFill>
+                        <a:srgbClr val="000000"/>
+                      </a:solidFill>
+                      <a:prstDash val="solid"/>
+                      <a:round/>
+                      <a:headEnd type="none" w="med" len="med"/>
+                      <a:tailEnd type="none" w="med" len="med"/>
+                    </a:lnR>
+                    <a:lnT cmpd="sng" algn="ctr" cap="flat" w="19050">
+                      <a:solidFill>
+                        <a:srgbClr val="000000"/>
+                      </a:solidFill>
+                      <a:prstDash val="solid"/>
+                      <a:round/>
+                      <a:headEnd type="none" w="med" len="med"/>
+                      <a:tailEnd type="none" w="med" len="med"/>
+                    </a:lnT>
+                    <a:lnB cmpd="sng" algn="ctr" cap="flat" w="19050">
+                      <a:solidFill>
+                        <a:srgbClr val="000000"/>
+                      </a:solidFill>
+                      <a:prstDash val="solid"/>
+                      <a:round/>
+                      <a:headEnd type="none" w="med" len="med"/>
+                      <a:tailEnd type="none" w="med" len="med"/>
+                    </a:lnB>
+                    <a:solidFill>
+                      <a:srgbClr val="FFFFFF"/>
+                    </a:solidFill>
+                  </a:tcPr>
+                </a:tc>
+                <a:tc>
+                  <a:txBody>
+                    <a:bodyPr anchor="t" rtlCol="false"/>
+                    <a:lstStyle/>
+                    <a:p>
+                      <a:pPr algn="l">
+                        <a:lnSpc>
+                          <a:spcPts val="2227"/>
+                        </a:lnSpc>
+                        <a:defRPr/>
+                      </a:pPr>
+                      <a:r>
+                        <a:rPr lang="en-US" sz="1591">
+                          <a:solidFill>
+                            <a:srgbClr val="000000"/>
+                          </a:solidFill>
+                          <a:latin typeface="Agrandir"/>
+                          <a:ea typeface="Agrandir"/>
+                          <a:cs typeface="Agrandir"/>
+                          <a:sym typeface="Agrandir"/>
+                        </a:rPr>
+                        <a:t>15</a:t>
+                      </a:r>
+                      <a:endParaRPr lang="en-US" sz="1100"/>
+                    </a:p>
+                  </a:txBody>
+                  <a:tcPr marL="66675" marR="66675" marT="66675" marB="66675" anchor="ctr">
+                    <a:lnL cmpd="sng" algn="ctr" cap="flat" w="19050">
+                      <a:solidFill>
+                        <a:srgbClr val="000000"/>
+                      </a:solidFill>
+                      <a:prstDash val="solid"/>
+                      <a:round/>
+                      <a:headEnd type="none" w="med" len="med"/>
+                      <a:tailEnd type="none" w="med" len="med"/>
+                    </a:lnL>
+                    <a:lnR cmpd="sng" algn="ctr" cap="flat" w="19050">
+                      <a:solidFill>
+                        <a:srgbClr val="000000"/>
+                      </a:solidFill>
+                      <a:prstDash val="solid"/>
+                      <a:round/>
+                      <a:headEnd type="none" w="med" len="med"/>
+                      <a:tailEnd type="none" w="med" len="med"/>
+                    </a:lnR>
+                    <a:lnT cmpd="sng" algn="ctr" cap="flat" w="19050">
+                      <a:solidFill>
+                        <a:srgbClr val="000000"/>
+                      </a:solidFill>
+                      <a:prstDash val="solid"/>
+                      <a:round/>
+                      <a:headEnd type="none" w="med" len="med"/>
+                      <a:tailEnd type="none" w="med" len="med"/>
+                    </a:lnT>
+                    <a:lnB cmpd="sng" algn="ctr" cap="flat" w="19050">
+                      <a:solidFill>
+                        <a:srgbClr val="000000"/>
+                      </a:solidFill>
+                      <a:prstDash val="solid"/>
+                      <a:round/>
+                      <a:headEnd type="none" w="med" len="med"/>
+                      <a:tailEnd type="none" w="med" len="med"/>
+                    </a:lnB>
+                    <a:solidFill>
+                      <a:srgbClr val="FFFFFF"/>
+                    </a:solidFill>
+                  </a:tcPr>
+                </a:tc>
+                <a:tc>
+                  <a:txBody>
+                    <a:bodyPr anchor="t" rtlCol="false"/>
+                    <a:lstStyle/>
+                    <a:p>
+                      <a:pPr algn="l">
+                        <a:lnSpc>
+                          <a:spcPts val="2227"/>
+                        </a:lnSpc>
+                        <a:defRPr/>
+                      </a:pPr>
+                      <a:r>
+                        <a:rPr lang="en-US" sz="1591">
+                          <a:solidFill>
+                            <a:srgbClr val="000000"/>
+                          </a:solidFill>
+                          <a:latin typeface="Agrandir"/>
+                          <a:ea typeface="Agrandir"/>
+                          <a:cs typeface="Agrandir"/>
+                          <a:sym typeface="Agrandir"/>
+                        </a:rPr>
+                        <a:t>(3 + 3) × 15 = </a:t>
+                      </a:r>
+                      <a:r>
+                        <a:rPr lang="en-US" sz="1591" b="true">
+                          <a:solidFill>
+                            <a:srgbClr val="000000"/>
+                          </a:solidFill>
+                          <a:latin typeface="Agrandir Bold"/>
+                          <a:ea typeface="Agrandir Bold"/>
+                          <a:cs typeface="Agrandir Bold"/>
+                          <a:sym typeface="Agrandir Bold"/>
+                        </a:rPr>
+                        <a:t>90</a:t>
+                      </a:r>
+                      <a:endParaRPr lang="en-US" sz="1100"/>
+                    </a:p>
+                  </a:txBody>
+                  <a:tcPr marL="66675" marR="66675" marT="66675" marB="66675" anchor="ctr">
+                    <a:lnL cmpd="sng" algn="ctr" cap="flat" w="19050">
+                      <a:solidFill>
+                        <a:srgbClr val="000000"/>
+                      </a:solidFill>
+                      <a:prstDash val="solid"/>
+                      <a:round/>
+                      <a:headEnd type="none" w="med" len="med"/>
+                      <a:tailEnd type="none" w="med" len="med"/>
+                    </a:lnL>
+                    <a:lnR cmpd="sng" algn="ctr" cap="flat" w="19050">
+                      <a:solidFill>
+                        <a:srgbClr val="000000"/>
+                      </a:solidFill>
+                      <a:prstDash val="solid"/>
+                      <a:round/>
+                      <a:headEnd type="none" w="med" len="med"/>
+                      <a:tailEnd type="none" w="med" len="med"/>
+                    </a:lnR>
+                    <a:lnT cmpd="sng" algn="ctr" cap="flat" w="19050">
+                      <a:solidFill>
+                        <a:srgbClr val="000000"/>
+                      </a:solidFill>
+                      <a:prstDash val="solid"/>
+                      <a:round/>
+                      <a:headEnd type="none" w="med" len="med"/>
+                      <a:tailEnd type="none" w="med" len="med"/>
+                    </a:lnT>
+                    <a:lnB cmpd="sng" algn="ctr" cap="flat" w="19050">
+                      <a:solidFill>
+                        <a:srgbClr val="000000"/>
+                      </a:solidFill>
+                      <a:prstDash val="solid"/>
+                      <a:round/>
+                      <a:headEnd type="none" w="med" len="med"/>
+                      <a:tailEnd type="none" w="med" len="med"/>
+                    </a:lnB>
+                    <a:solidFill>
+                      <a:srgbClr val="FFFFFF"/>
+                    </a:solidFill>
+                  </a:tcPr>
+                </a:tc>
+              </a:tr>
+              <a:tr h="1298147">
+                <a:tc>
+                  <a:txBody>
+                    <a:bodyPr anchor="t" rtlCol="false"/>
+                    <a:lstStyle/>
+                    <a:p>
+                      <a:pPr algn="l">
+                        <a:lnSpc>
+                          <a:spcPts val="2227"/>
+                        </a:lnSpc>
+                        <a:defRPr/>
+                      </a:pPr>
+                      <a:r>
+                        <a:rPr lang="en-US" sz="1591" b="true">
+                          <a:solidFill>
+                            <a:srgbClr val="000000"/>
+                          </a:solidFill>
+                          <a:latin typeface="Agrandir Bold"/>
+                          <a:ea typeface="Agrandir Bold"/>
+                          <a:cs typeface="Agrandir Bold"/>
+                          <a:sym typeface="Agrandir Bold"/>
+                        </a:rPr>
+                        <a:t>Performance</a:t>
+                      </a:r>
+                      <a:endParaRPr lang="en-US" sz="1100"/>
+                    </a:p>
+                  </a:txBody>
+                  <a:tcPr marL="66675" marR="66675" marT="66675" marB="66675" anchor="ctr">
+                    <a:lnL cmpd="sng" algn="ctr" cap="flat" w="19050">
+                      <a:solidFill>
+                        <a:srgbClr val="000000"/>
+                      </a:solidFill>
+                      <a:prstDash val="solid"/>
+                      <a:round/>
+                      <a:headEnd type="none" w="med" len="med"/>
+                      <a:tailEnd type="none" w="med" len="med"/>
+                    </a:lnL>
+                    <a:lnR cmpd="sng" algn="ctr" cap="flat" w="19050">
+                      <a:solidFill>
+                        <a:srgbClr val="000000"/>
+                      </a:solidFill>
+                      <a:prstDash val="solid"/>
+                      <a:round/>
+                      <a:headEnd type="none" w="med" len="med"/>
+                      <a:tailEnd type="none" w="med" len="med"/>
+                    </a:lnR>
+                    <a:lnT cmpd="sng" algn="ctr" cap="flat" w="19050">
+                      <a:solidFill>
+                        <a:srgbClr val="000000"/>
+                      </a:solidFill>
+                      <a:prstDash val="solid"/>
+                      <a:round/>
+                      <a:headEnd type="none" w="med" len="med"/>
+                      <a:tailEnd type="none" w="med" len="med"/>
+                    </a:lnT>
+                    <a:lnB cmpd="sng" algn="ctr" cap="flat" w="19050">
+                      <a:solidFill>
+                        <a:srgbClr val="000000"/>
+                      </a:solidFill>
+                      <a:prstDash val="solid"/>
+                      <a:round/>
+                      <a:headEnd type="none" w="med" len="med"/>
+                      <a:tailEnd type="none" w="med" len="med"/>
+                    </a:lnB>
+                    <a:solidFill>
+                      <a:srgbClr val="F1E3E3"/>
+                    </a:solidFill>
+                  </a:tcPr>
+                </a:tc>
+                <a:tc>
+                  <a:txBody>
+                    <a:bodyPr anchor="t" rtlCol="false"/>
+                    <a:lstStyle/>
+                    <a:p>
+                      <a:pPr algn="l">
+                        <a:lnSpc>
+                          <a:spcPts val="2227"/>
+                        </a:lnSpc>
+                        <a:defRPr/>
+                      </a:pPr>
+                      <a:r>
+                        <a:rPr lang="en-US" sz="1591">
+                          <a:solidFill>
+                            <a:srgbClr val="000000"/>
+                          </a:solidFill>
+                          <a:latin typeface="Agrandir"/>
+                          <a:ea typeface="Agrandir"/>
+                          <a:cs typeface="Agrandir"/>
+                          <a:sym typeface="Agrandir"/>
+                        </a:rPr>
+                        <a:t>Measures the speed and responsiveness of the recommendation engine, especially under typical or peak loads, ensuring timely results for the end user.</a:t>
+                      </a:r>
+                      <a:endParaRPr lang="en-US" sz="1100"/>
+                    </a:p>
+                  </a:txBody>
+                  <a:tcPr marL="66675" marR="66675" marT="66675" marB="66675" anchor="ctr">
+                    <a:lnL cmpd="sng" algn="ctr" cap="flat" w="19050">
+                      <a:solidFill>
+                        <a:srgbClr val="000000"/>
+                      </a:solidFill>
+                      <a:prstDash val="solid"/>
+                      <a:round/>
+                      <a:headEnd type="none" w="med" len="med"/>
+                      <a:tailEnd type="none" w="med" len="med"/>
+                    </a:lnL>
+                    <a:lnR cmpd="sng" algn="ctr" cap="flat" w="19050">
+                      <a:solidFill>
+                        <a:srgbClr val="000000"/>
+                      </a:solidFill>
+                      <a:prstDash val="solid"/>
+                      <a:round/>
+                      <a:headEnd type="none" w="med" len="med"/>
+                      <a:tailEnd type="none" w="med" len="med"/>
+                    </a:lnR>
+                    <a:lnT cmpd="sng" algn="ctr" cap="flat" w="19050">
+                      <a:solidFill>
+                        <a:srgbClr val="000000"/>
+                      </a:solidFill>
+                      <a:prstDash val="solid"/>
+                      <a:round/>
+                      <a:headEnd type="none" w="med" len="med"/>
+                      <a:tailEnd type="none" w="med" len="med"/>
+                    </a:lnT>
+                    <a:lnB cmpd="sng" algn="ctr" cap="flat" w="19050">
+                      <a:solidFill>
+                        <a:srgbClr val="000000"/>
+                      </a:solidFill>
+                      <a:prstDash val="solid"/>
+                      <a:round/>
+                      <a:headEnd type="none" w="med" len="med"/>
+                      <a:tailEnd type="none" w="med" len="med"/>
+                    </a:lnB>
+                    <a:solidFill>
+                      <a:srgbClr val="FFFFFF"/>
+                    </a:solidFill>
+                  </a:tcPr>
+                </a:tc>
+                <a:tc>
+                  <a:txBody>
+                    <a:bodyPr anchor="t" rtlCol="false"/>
+                    <a:lstStyle/>
+                    <a:p>
+                      <a:pPr algn="l">
+                        <a:lnSpc>
+                          <a:spcPts val="2227"/>
+                        </a:lnSpc>
+                        <a:defRPr/>
+                      </a:pPr>
+                      <a:r>
+                        <a:rPr lang="en-US" sz="1591">
+                          <a:solidFill>
+                            <a:srgbClr val="000000"/>
+                          </a:solidFill>
+                          <a:latin typeface="Agrandir"/>
+                          <a:ea typeface="Agrandir"/>
+                          <a:cs typeface="Agrandir"/>
+                          <a:sym typeface="Agrandir"/>
+                        </a:rPr>
+                        <a:t>- Average response time (&lt; X seconds)- Throughput (# of recommendation queries handled per second)</a:t>
+                      </a:r>
+                      <a:endParaRPr lang="en-US" sz="1100"/>
+                    </a:p>
+                  </a:txBody>
+                  <a:tcPr marL="66675" marR="66675" marT="66675" marB="66675" anchor="ctr">
+                    <a:lnL cmpd="sng" algn="ctr" cap="flat" w="19050">
+                      <a:solidFill>
+                        <a:srgbClr val="000000"/>
+                      </a:solidFill>
+                      <a:prstDash val="solid"/>
+                      <a:round/>
+                      <a:headEnd type="none" w="med" len="med"/>
+                      <a:tailEnd type="none" w="med" len="med"/>
+                    </a:lnL>
+                    <a:lnR cmpd="sng" algn="ctr" cap="flat" w="19050">
+                      <a:solidFill>
+                        <a:srgbClr val="000000"/>
+                      </a:solidFill>
+                      <a:prstDash val="solid"/>
+                      <a:round/>
+                      <a:headEnd type="none" w="med" len="med"/>
+                      <a:tailEnd type="none" w="med" len="med"/>
+                    </a:lnR>
+                    <a:lnT cmpd="sng" algn="ctr" cap="flat" w="19050">
+                      <a:solidFill>
+                        <a:srgbClr val="000000"/>
+                      </a:solidFill>
+                      <a:prstDash val="solid"/>
+                      <a:round/>
+                      <a:headEnd type="none" w="med" len="med"/>
+                      <a:tailEnd type="none" w="med" len="med"/>
+                    </a:lnT>
+                    <a:lnB cmpd="sng" algn="ctr" cap="flat" w="19050">
+                      <a:solidFill>
+                        <a:srgbClr val="000000"/>
+                      </a:solidFill>
+                      <a:prstDash val="solid"/>
+                      <a:round/>
+                      <a:headEnd type="none" w="med" len="med"/>
+                      <a:tailEnd type="none" w="med" len="med"/>
+                    </a:lnB>
+                    <a:solidFill>
+                      <a:srgbClr val="FFFFFF"/>
+                    </a:solidFill>
+                  </a:tcPr>
+                </a:tc>
+                <a:tc>
+                  <a:txBody>
+                    <a:bodyPr anchor="t" rtlCol="false"/>
+                    <a:lstStyle/>
+                    <a:p>
+                      <a:pPr algn="l">
+                        <a:lnSpc>
+                          <a:spcPts val="2227"/>
+                        </a:lnSpc>
+                        <a:defRPr/>
+                      </a:pPr>
+                      <a:r>
+                        <a:rPr lang="en-US" sz="1591">
+                          <a:solidFill>
+                            <a:srgbClr val="000000"/>
+                          </a:solidFill>
+                          <a:latin typeface="Agrandir"/>
+                          <a:ea typeface="Agrandir"/>
+                          <a:cs typeface="Agrandir"/>
+                          <a:sym typeface="Agrandir"/>
+                        </a:rPr>
+                        <a:t>3</a:t>
+                      </a:r>
+                      <a:endParaRPr lang="en-US" sz="1100"/>
+                    </a:p>
+                  </a:txBody>
+                  <a:tcPr marL="66675" marR="66675" marT="66675" marB="66675" anchor="ctr">
+                    <a:lnL cmpd="sng" algn="ctr" cap="flat" w="19050">
+                      <a:solidFill>
+                        <a:srgbClr val="000000"/>
+                      </a:solidFill>
+                      <a:prstDash val="solid"/>
+                      <a:round/>
+                      <a:headEnd type="none" w="med" len="med"/>
+                      <a:tailEnd type="none" w="med" len="med"/>
+                    </a:lnL>
+                    <a:lnR cmpd="sng" algn="ctr" cap="flat" w="19050">
+                      <a:solidFill>
+                        <a:srgbClr val="000000"/>
+                      </a:solidFill>
+                      <a:prstDash val="solid"/>
+                      <a:round/>
+                      <a:headEnd type="none" w="med" len="med"/>
+                      <a:tailEnd type="none" w="med" len="med"/>
+                    </a:lnR>
+                    <a:lnT cmpd="sng" algn="ctr" cap="flat" w="19050">
+                      <a:solidFill>
+                        <a:srgbClr val="000000"/>
+                      </a:solidFill>
+                      <a:prstDash val="solid"/>
+                      <a:round/>
+                      <a:headEnd type="none" w="med" len="med"/>
+                      <a:tailEnd type="none" w="med" len="med"/>
+                    </a:lnT>
+                    <a:lnB cmpd="sng" algn="ctr" cap="flat" w="19050">
+                      <a:solidFill>
+                        <a:srgbClr val="000000"/>
+                      </a:solidFill>
+                      <a:prstDash val="solid"/>
+                      <a:round/>
+                      <a:headEnd type="none" w="med" len="med"/>
+                      <a:tailEnd type="none" w="med" len="med"/>
+                    </a:lnB>
+                    <a:solidFill>
+                      <a:srgbClr val="FFFFFF"/>
+                    </a:solidFill>
+                  </a:tcPr>
+                </a:tc>
+                <a:tc>
+                  <a:txBody>
+                    <a:bodyPr anchor="t" rtlCol="false"/>
+                    <a:lstStyle/>
+                    <a:p>
+                      <a:pPr algn="l">
                         <a:lnSpc>
                           <a:spcPts val="2227"/>
                         </a:lnSpc>
@@ -15030,7 +15972,7 @@
                       <a:endParaRPr lang="en-US" sz="1100"/>
                     </a:p>
                   </a:txBody>
-                  <a:tcPr marL="76200" marR="76200" marT="76200" marB="76200" anchor="ctr">
+                  <a:tcPr marL="66675" marR="66675" marT="66675" marB="66675" anchor="ctr">
                     <a:lnL cmpd="sng" algn="ctr" cap="flat" w="19050">
                       <a:solidFill>
                         <a:srgbClr val="000000"/>
@@ -15077,7 +16019,7 @@
                     <a:bodyPr anchor="t" rtlCol="false"/>
                     <a:lstStyle/>
                     <a:p>
-                      <a:pPr algn="ctr">
+                      <a:pPr algn="l">
                         <a:lnSpc>
                           <a:spcPts val="2227"/>
                         </a:lnSpc>
@@ -15093,12 +16035,12 @@
                           <a:cs typeface="Agrandir"/>
                           <a:sym typeface="Agrandir"/>
                         </a:rPr>
-                        <a:t>30</a:t>
+                        <a:t>20</a:t>
                       </a:r>
                       <a:endParaRPr lang="en-US" sz="1100"/>
                     </a:p>
                   </a:txBody>
-                  <a:tcPr marL="76200" marR="76200" marT="76200" marB="76200" anchor="ctr">
+                  <a:tcPr marL="66675" marR="66675" marT="66675" marB="66675" anchor="ctr">
                     <a:lnL cmpd="sng" algn="ctr" cap="flat" w="19050">
                       <a:solidFill>
                         <a:srgbClr val="000000"/>
@@ -15161,7 +16103,7 @@
                           <a:cs typeface="Agrandir"/>
                           <a:sym typeface="Agrandir"/>
                         </a:rPr>
-                        <a:t>(3 + 2) × 30 = </a:t>
+                        <a:t>(3 + 2) × 20 = </a:t>
                       </a:r>
                       <a:r>
                         <a:rPr lang="en-US" sz="1591" b="true">
@@ -15173,12 +16115,12 @@
                           <a:cs typeface="Agrandir Bold"/>
                           <a:sym typeface="Agrandir Bold"/>
                         </a:rPr>
-                        <a:t>150</a:t>
+                        <a:t>100</a:t>
                       </a:r>
                       <a:endParaRPr lang="en-US" sz="1100"/>
                     </a:p>
                   </a:txBody>
-                  <a:tcPr marL="76200" marR="76200" marT="76200" marB="76200" anchor="ctr">
+                  <a:tcPr marL="66675" marR="66675" marT="66675" marB="66675" anchor="ctr">
                     <a:lnL cmpd="sng" algn="ctr" cap="flat" w="19050">
                       <a:solidFill>
                         <a:srgbClr val="000000"/>
@@ -15221,7 +16163,7 @@
                   </a:tcPr>
                 </a:tc>
               </a:tr>
-              <a:tr h="1244112">
+              <a:tr h="1021337">
                 <a:tc>
                   <a:txBody>
                     <a:bodyPr anchor="t" rtlCol="false"/>
@@ -15243,12 +16185,12 @@
                           <a:cs typeface="Agrandir Bold"/>
                           <a:sym typeface="Agrandir Bold"/>
                         </a:rPr>
-                        <a:t>Performance</a:t>
+                        <a:t>Maintainability</a:t>
                       </a:r>
                       <a:endParaRPr lang="en-US" sz="1100"/>
                     </a:p>
                   </a:txBody>
-                  <a:tcPr marL="76200" marR="76200" marT="76200" marB="76200" anchor="ctr">
+                  <a:tcPr marL="66675" marR="66675" marT="66675" marB="66675" anchor="ctr">
                     <a:lnL cmpd="sng" algn="ctr" cap="flat" w="19050">
                       <a:solidFill>
                         <a:srgbClr val="000000"/>
@@ -15311,12 +16253,12 @@
                           <a:cs typeface="Agrandir"/>
                           <a:sym typeface="Agrandir"/>
                         </a:rPr>
-                        <a:t>Evaluates the computational efficiency and responsiveness of the engine, ensuring real-time or near real-time processing of recommendation queries.</a:t>
+                        <a:t>Focuses on how easily the engine’s codebase and architecture can be updated, extended, debugged, and improved over time without introducing new defects.</a:t>
                       </a:r>
                       <a:endParaRPr lang="en-US" sz="1100"/>
                     </a:p>
                   </a:txBody>
-                  <a:tcPr marL="76200" marR="76200" marT="76200" marB="76200" anchor="ctr">
+                  <a:tcPr marL="66675" marR="66675" marT="66675" marB="66675" anchor="ctr">
                     <a:lnL cmpd="sng" algn="ctr" cap="flat" w="19050">
                       <a:solidFill>
                         <a:srgbClr val="000000"/>
@@ -15379,15 +16321,63 @@
                           <a:cs typeface="Agrandir"/>
                           <a:sym typeface="Agrandir"/>
                         </a:rPr>
-                        <a:t>Average</a:t>
+                        <a:t>- Mean time to fix (MTTF) &lt; X days- Code coverage or cyclomatic complexity metrics</a:t>
                       </a:r>
                       <a:endParaRPr lang="en-US" sz="1100"/>
                     </a:p>
+                  </a:txBody>
+                  <a:tcPr marL="66675" marR="66675" marT="66675" marB="66675" anchor="ctr">
+                    <a:lnL cmpd="sng" algn="ctr" cap="flat" w="19050">
+                      <a:solidFill>
+                        <a:srgbClr val="000000"/>
+                      </a:solidFill>
+                      <a:prstDash val="solid"/>
+                      <a:round/>
+                      <a:headEnd type="none" w="med" len="med"/>
+                      <a:tailEnd type="none" w="med" len="med"/>
+                    </a:lnL>
+                    <a:lnR cmpd="sng" algn="ctr" cap="flat" w="19050">
+                      <a:solidFill>
+                        <a:srgbClr val="000000"/>
+                      </a:solidFill>
+                      <a:prstDash val="solid"/>
+                      <a:round/>
+                      <a:headEnd type="none" w="med" len="med"/>
+                      <a:tailEnd type="none" w="med" len="med"/>
+                    </a:lnR>
+                    <a:lnT cmpd="sng" algn="ctr" cap="flat" w="19050">
+                      <a:solidFill>
+                        <a:srgbClr val="000000"/>
+                      </a:solidFill>
+                      <a:prstDash val="solid"/>
+                      <a:round/>
+                      <a:headEnd type="none" w="med" len="med"/>
+                      <a:tailEnd type="none" w="med" len="med"/>
+                    </a:lnT>
+                    <a:lnB cmpd="sng" algn="ctr" cap="flat" w="19050">
+                      <a:solidFill>
+                        <a:srgbClr val="000000"/>
+                      </a:solidFill>
+                      <a:prstDash val="solid"/>
+                      <a:round/>
+                      <a:headEnd type="none" w="med" len="med"/>
+                      <a:tailEnd type="none" w="med" len="med"/>
+                    </a:lnB>
+                    <a:solidFill>
+                      <a:srgbClr val="FFFFFF"/>
+                    </a:solidFill>
+                  </a:tcPr>
+                </a:tc>
+                <a:tc>
+                  <a:txBody>
+                    <a:bodyPr anchor="t" rtlCol="false"/>
+                    <a:lstStyle/>
                     <a:p>
                       <a:pPr algn="l">
                         <a:lnSpc>
                           <a:spcPts val="2227"/>
                         </a:lnSpc>
+                        <a:defRPr/>
                       </a:pPr>
                       <a:r>
                         <a:rPr lang="en-US" sz="1591">
@@ -15399,11 +16389,12 @@
                           <a:cs typeface="Agrandir"/>
                           <a:sym typeface="Agrandir"/>
                         </a:rPr>
-                        <a:t>  response time &lt; 5 seconds per query</a:t>
+                        <a:t>2</a:t>
                       </a:r>
+                      <a:endParaRPr lang="en-US" sz="1100"/>
                     </a:p>
                   </a:txBody>
-                  <a:tcPr marL="76200" marR="76200" marT="76200" marB="76200" anchor="ctr">
+                  <a:tcPr marL="66675" marR="66675" marT="66675" marB="66675" anchor="ctr">
                     <a:lnL cmpd="sng" algn="ctr" cap="flat" w="19050">
                       <a:solidFill>
                         <a:srgbClr val="000000"/>
@@ -15450,7 +16441,919 @@
                     <a:bodyPr anchor="t" rtlCol="false"/>
                     <a:lstStyle/>
                     <a:p>
-                      <a:pPr algn="ctr">
+                      <a:pPr algn="l">
+                        <a:lnSpc>
+                          <a:spcPts val="2227"/>
+                        </a:lnSpc>
+                        <a:defRPr/>
+                      </a:pPr>
+                      <a:r>
+                        <a:rPr lang="en-US" sz="1591">
+                          <a:solidFill>
+                            <a:srgbClr val="000000"/>
+                          </a:solidFill>
+                          <a:latin typeface="Agrandir"/>
+                          <a:ea typeface="Agrandir"/>
+                          <a:cs typeface="Agrandir"/>
+                          <a:sym typeface="Agrandir"/>
+                        </a:rPr>
+                        <a:t>2</a:t>
+                      </a:r>
+                      <a:endParaRPr lang="en-US" sz="1100"/>
+                    </a:p>
+                  </a:txBody>
+                  <a:tcPr marL="66675" marR="66675" marT="66675" marB="66675" anchor="ctr">
+                    <a:lnL cmpd="sng" algn="ctr" cap="flat" w="19050">
+                      <a:solidFill>
+                        <a:srgbClr val="000000"/>
+                      </a:solidFill>
+                      <a:prstDash val="solid"/>
+                      <a:round/>
+                      <a:headEnd type="none" w="med" len="med"/>
+                      <a:tailEnd type="none" w="med" len="med"/>
+                    </a:lnL>
+                    <a:lnR cmpd="sng" algn="ctr" cap="flat" w="19050">
+                      <a:solidFill>
+                        <a:srgbClr val="000000"/>
+                      </a:solidFill>
+                      <a:prstDash val="solid"/>
+                      <a:round/>
+                      <a:headEnd type="none" w="med" len="med"/>
+                      <a:tailEnd type="none" w="med" len="med"/>
+                    </a:lnR>
+                    <a:lnT cmpd="sng" algn="ctr" cap="flat" w="19050">
+                      <a:solidFill>
+                        <a:srgbClr val="000000"/>
+                      </a:solidFill>
+                      <a:prstDash val="solid"/>
+                      <a:round/>
+                      <a:headEnd type="none" w="med" len="med"/>
+                      <a:tailEnd type="none" w="med" len="med"/>
+                    </a:lnT>
+                    <a:lnB cmpd="sng" algn="ctr" cap="flat" w="19050">
+                      <a:solidFill>
+                        <a:srgbClr val="000000"/>
+                      </a:solidFill>
+                      <a:prstDash val="solid"/>
+                      <a:round/>
+                      <a:headEnd type="none" w="med" len="med"/>
+                      <a:tailEnd type="none" w="med" len="med"/>
+                    </a:lnB>
+                    <a:solidFill>
+                      <a:srgbClr val="FFFFFF"/>
+                    </a:solidFill>
+                  </a:tcPr>
+                </a:tc>
+                <a:tc>
+                  <a:txBody>
+                    <a:bodyPr anchor="t" rtlCol="false"/>
+                    <a:lstStyle/>
+                    <a:p>
+                      <a:pPr algn="l">
+                        <a:lnSpc>
+                          <a:spcPts val="2227"/>
+                        </a:lnSpc>
+                        <a:defRPr/>
+                      </a:pPr>
+                      <a:r>
+                        <a:rPr lang="en-US" sz="1591">
+                          <a:solidFill>
+                            <a:srgbClr val="000000"/>
+                          </a:solidFill>
+                          <a:latin typeface="Agrandir"/>
+                          <a:ea typeface="Agrandir"/>
+                          <a:cs typeface="Agrandir"/>
+                          <a:sym typeface="Agrandir"/>
+                        </a:rPr>
+                        <a:t>15</a:t>
+                      </a:r>
+                      <a:endParaRPr lang="en-US" sz="1100"/>
+                    </a:p>
+                  </a:txBody>
+                  <a:tcPr marL="66675" marR="66675" marT="66675" marB="66675" anchor="ctr">
+                    <a:lnL cmpd="sng" algn="ctr" cap="flat" w="19050">
+                      <a:solidFill>
+                        <a:srgbClr val="000000"/>
+                      </a:solidFill>
+                      <a:prstDash val="solid"/>
+                      <a:round/>
+                      <a:headEnd type="none" w="med" len="med"/>
+                      <a:tailEnd type="none" w="med" len="med"/>
+                    </a:lnL>
+                    <a:lnR cmpd="sng" algn="ctr" cap="flat" w="19050">
+                      <a:solidFill>
+                        <a:srgbClr val="000000"/>
+                      </a:solidFill>
+                      <a:prstDash val="solid"/>
+                      <a:round/>
+                      <a:headEnd type="none" w="med" len="med"/>
+                      <a:tailEnd type="none" w="med" len="med"/>
+                    </a:lnR>
+                    <a:lnT cmpd="sng" algn="ctr" cap="flat" w="19050">
+                      <a:solidFill>
+                        <a:srgbClr val="000000"/>
+                      </a:solidFill>
+                      <a:prstDash val="solid"/>
+                      <a:round/>
+                      <a:headEnd type="none" w="med" len="med"/>
+                      <a:tailEnd type="none" w="med" len="med"/>
+                    </a:lnT>
+                    <a:lnB cmpd="sng" algn="ctr" cap="flat" w="19050">
+                      <a:solidFill>
+                        <a:srgbClr val="000000"/>
+                      </a:solidFill>
+                      <a:prstDash val="solid"/>
+                      <a:round/>
+                      <a:headEnd type="none" w="med" len="med"/>
+                      <a:tailEnd type="none" w="med" len="med"/>
+                    </a:lnB>
+                    <a:solidFill>
+                      <a:srgbClr val="FFFFFF"/>
+                    </a:solidFill>
+                  </a:tcPr>
+                </a:tc>
+                <a:tc>
+                  <a:txBody>
+                    <a:bodyPr anchor="t" rtlCol="false"/>
+                    <a:lstStyle/>
+                    <a:p>
+                      <a:pPr algn="l">
+                        <a:lnSpc>
+                          <a:spcPts val="2227"/>
+                        </a:lnSpc>
+                        <a:defRPr/>
+                      </a:pPr>
+                      <a:r>
+                        <a:rPr lang="en-US" sz="1591">
+                          <a:solidFill>
+                            <a:srgbClr val="000000"/>
+                          </a:solidFill>
+                          <a:latin typeface="Agrandir"/>
+                          <a:ea typeface="Agrandir"/>
+                          <a:cs typeface="Agrandir"/>
+                          <a:sym typeface="Agrandir"/>
+                        </a:rPr>
+                        <a:t>(2 + 2) × 15 = </a:t>
+                      </a:r>
+                      <a:r>
+                        <a:rPr lang="en-US" sz="1591" b="true">
+                          <a:solidFill>
+                            <a:srgbClr val="000000"/>
+                          </a:solidFill>
+                          <a:latin typeface="Agrandir Bold"/>
+                          <a:ea typeface="Agrandir Bold"/>
+                          <a:cs typeface="Agrandir Bold"/>
+                          <a:sym typeface="Agrandir Bold"/>
+                        </a:rPr>
+                        <a:t>60</a:t>
+                      </a:r>
+                      <a:endParaRPr lang="en-US" sz="1100"/>
+                    </a:p>
+                  </a:txBody>
+                  <a:tcPr marL="66675" marR="66675" marT="66675" marB="66675" anchor="ctr">
+                    <a:lnL cmpd="sng" algn="ctr" cap="flat" w="19050">
+                      <a:solidFill>
+                        <a:srgbClr val="000000"/>
+                      </a:solidFill>
+                      <a:prstDash val="solid"/>
+                      <a:round/>
+                      <a:headEnd type="none" w="med" len="med"/>
+                      <a:tailEnd type="none" w="med" len="med"/>
+                    </a:lnL>
+                    <a:lnR cmpd="sng" algn="ctr" cap="flat" w="19050">
+                      <a:solidFill>
+                        <a:srgbClr val="000000"/>
+                      </a:solidFill>
+                      <a:prstDash val="solid"/>
+                      <a:round/>
+                      <a:headEnd type="none" w="med" len="med"/>
+                      <a:tailEnd type="none" w="med" len="med"/>
+                    </a:lnR>
+                    <a:lnT cmpd="sng" algn="ctr" cap="flat" w="19050">
+                      <a:solidFill>
+                        <a:srgbClr val="000000"/>
+                      </a:solidFill>
+                      <a:prstDash val="solid"/>
+                      <a:round/>
+                      <a:headEnd type="none" w="med" len="med"/>
+                      <a:tailEnd type="none" w="med" len="med"/>
+                    </a:lnT>
+                    <a:lnB cmpd="sng" algn="ctr" cap="flat" w="19050">
+                      <a:solidFill>
+                        <a:srgbClr val="000000"/>
+                      </a:solidFill>
+                      <a:prstDash val="solid"/>
+                      <a:round/>
+                      <a:headEnd type="none" w="med" len="med"/>
+                      <a:tailEnd type="none" w="med" len="med"/>
+                    </a:lnB>
+                    <a:solidFill>
+                      <a:srgbClr val="FFFFFF"/>
+                    </a:solidFill>
+                  </a:tcPr>
+                </a:tc>
+              </a:tr>
+              <a:tr h="1021337">
+                <a:tc>
+                  <a:txBody>
+                    <a:bodyPr anchor="t" rtlCol="false"/>
+                    <a:lstStyle/>
+                    <a:p>
+                      <a:pPr algn="l">
+                        <a:lnSpc>
+                          <a:spcPts val="2227"/>
+                        </a:lnSpc>
+                        <a:defRPr/>
+                      </a:pPr>
+                      <a:r>
+                        <a:rPr lang="en-US" sz="1591" b="true">
+                          <a:solidFill>
+                            <a:srgbClr val="000000"/>
+                          </a:solidFill>
+                          <a:latin typeface="Agrandir Bold"/>
+                          <a:ea typeface="Agrandir Bold"/>
+                          <a:cs typeface="Agrandir Bold"/>
+                          <a:sym typeface="Agrandir Bold"/>
+                        </a:rPr>
+                        <a:t>Compatibility</a:t>
+                      </a:r>
+                      <a:endParaRPr lang="en-US" sz="1100"/>
+                    </a:p>
+                  </a:txBody>
+                  <a:tcPr marL="66675" marR="66675" marT="66675" marB="66675" anchor="ctr">
+                    <a:lnL cmpd="sng" algn="ctr" cap="flat" w="19050">
+                      <a:solidFill>
+                        <a:srgbClr val="000000"/>
+                      </a:solidFill>
+                      <a:prstDash val="solid"/>
+                      <a:round/>
+                      <a:headEnd type="none" w="med" len="med"/>
+                      <a:tailEnd type="none" w="med" len="med"/>
+                    </a:lnL>
+                    <a:lnR cmpd="sng" algn="ctr" cap="flat" w="19050">
+                      <a:solidFill>
+                        <a:srgbClr val="000000"/>
+                      </a:solidFill>
+                      <a:prstDash val="solid"/>
+                      <a:round/>
+                      <a:headEnd type="none" w="med" len="med"/>
+                      <a:tailEnd type="none" w="med" len="med"/>
+                    </a:lnR>
+                    <a:lnT cmpd="sng" algn="ctr" cap="flat" w="19050">
+                      <a:solidFill>
+                        <a:srgbClr val="000000"/>
+                      </a:solidFill>
+                      <a:prstDash val="solid"/>
+                      <a:round/>
+                      <a:headEnd type="none" w="med" len="med"/>
+                      <a:tailEnd type="none" w="med" len="med"/>
+                    </a:lnT>
+                    <a:lnB cmpd="sng" algn="ctr" cap="flat" w="19050">
+                      <a:solidFill>
+                        <a:srgbClr val="000000"/>
+                      </a:solidFill>
+                      <a:prstDash val="solid"/>
+                      <a:round/>
+                      <a:headEnd type="none" w="med" len="med"/>
+                      <a:tailEnd type="none" w="med" len="med"/>
+                    </a:lnB>
+                    <a:solidFill>
+                      <a:srgbClr val="F1E3E3"/>
+                    </a:solidFill>
+                  </a:tcPr>
+                </a:tc>
+                <a:tc>
+                  <a:txBody>
+                    <a:bodyPr anchor="t" rtlCol="false"/>
+                    <a:lstStyle/>
+                    <a:p>
+                      <a:pPr algn="l">
+                        <a:lnSpc>
+                          <a:spcPts val="2227"/>
+                        </a:lnSpc>
+                        <a:defRPr/>
+                      </a:pPr>
+                      <a:r>
+                        <a:rPr lang="en-US" sz="1591">
+                          <a:solidFill>
+                            <a:srgbClr val="000000"/>
+                          </a:solidFill>
+                          <a:latin typeface="Agrandir"/>
+                          <a:ea typeface="Agrandir"/>
+                          <a:cs typeface="Agrandir"/>
+                          <a:sym typeface="Agrandir"/>
+                        </a:rPr>
+                        <a:t>Evaluates the degree to which the engine can integrate with diverse platforms, databases, and interfaces, ensuring seamless communication and data exchange.</a:t>
+                      </a:r>
+                      <a:endParaRPr lang="en-US" sz="1100"/>
+                    </a:p>
+                  </a:txBody>
+                  <a:tcPr marL="66675" marR="66675" marT="66675" marB="66675" anchor="ctr">
+                    <a:lnL cmpd="sng" algn="ctr" cap="flat" w="19050">
+                      <a:solidFill>
+                        <a:srgbClr val="000000"/>
+                      </a:solidFill>
+                      <a:prstDash val="solid"/>
+                      <a:round/>
+                      <a:headEnd type="none" w="med" len="med"/>
+                      <a:tailEnd type="none" w="med" len="med"/>
+                    </a:lnL>
+                    <a:lnR cmpd="sng" algn="ctr" cap="flat" w="19050">
+                      <a:solidFill>
+                        <a:srgbClr val="000000"/>
+                      </a:solidFill>
+                      <a:prstDash val="solid"/>
+                      <a:round/>
+                      <a:headEnd type="none" w="med" len="med"/>
+                      <a:tailEnd type="none" w="med" len="med"/>
+                    </a:lnR>
+                    <a:lnT cmpd="sng" algn="ctr" cap="flat" w="19050">
+                      <a:solidFill>
+                        <a:srgbClr val="000000"/>
+                      </a:solidFill>
+                      <a:prstDash val="solid"/>
+                      <a:round/>
+                      <a:headEnd type="none" w="med" len="med"/>
+                      <a:tailEnd type="none" w="med" len="med"/>
+                    </a:lnT>
+                    <a:lnB cmpd="sng" algn="ctr" cap="flat" w="19050">
+                      <a:solidFill>
+                        <a:srgbClr val="000000"/>
+                      </a:solidFill>
+                      <a:prstDash val="solid"/>
+                      <a:round/>
+                      <a:headEnd type="none" w="med" len="med"/>
+                      <a:tailEnd type="none" w="med" len="med"/>
+                    </a:lnB>
+                    <a:solidFill>
+                      <a:srgbClr val="FFFFFF"/>
+                    </a:solidFill>
+                  </a:tcPr>
+                </a:tc>
+                <a:tc>
+                  <a:txBody>
+                    <a:bodyPr anchor="t" rtlCol="false"/>
+                    <a:lstStyle/>
+                    <a:p>
+                      <a:pPr algn="l">
+                        <a:lnSpc>
+                          <a:spcPts val="2227"/>
+                        </a:lnSpc>
+                        <a:defRPr/>
+                      </a:pPr>
+                      <a:r>
+                        <a:rPr lang="en-US" sz="1591">
+                          <a:solidFill>
+                            <a:srgbClr val="000000"/>
+                          </a:solidFill>
+                          <a:latin typeface="Agrandir"/>
+                          <a:ea typeface="Agrandir"/>
+                          <a:cs typeface="Agrandir"/>
+                          <a:sym typeface="Agrandir"/>
+                        </a:rPr>
+                        <a:t>- Successful interoperability tests with external APIs- Backward compatibility with previous versions</a:t>
+                      </a:r>
+                      <a:endParaRPr lang="en-US" sz="1100"/>
+                    </a:p>
+                  </a:txBody>
+                  <a:tcPr marL="66675" marR="66675" marT="66675" marB="66675" anchor="ctr">
+                    <a:lnL cmpd="sng" algn="ctr" cap="flat" w="19050">
+                      <a:solidFill>
+                        <a:srgbClr val="000000"/>
+                      </a:solidFill>
+                      <a:prstDash val="solid"/>
+                      <a:round/>
+                      <a:headEnd type="none" w="med" len="med"/>
+                      <a:tailEnd type="none" w="med" len="med"/>
+                    </a:lnL>
+                    <a:lnR cmpd="sng" algn="ctr" cap="flat" w="19050">
+                      <a:solidFill>
+                        <a:srgbClr val="000000"/>
+                      </a:solidFill>
+                      <a:prstDash val="solid"/>
+                      <a:round/>
+                      <a:headEnd type="none" w="med" len="med"/>
+                      <a:tailEnd type="none" w="med" len="med"/>
+                    </a:lnR>
+                    <a:lnT cmpd="sng" algn="ctr" cap="flat" w="19050">
+                      <a:solidFill>
+                        <a:srgbClr val="000000"/>
+                      </a:solidFill>
+                      <a:prstDash val="solid"/>
+                      <a:round/>
+                      <a:headEnd type="none" w="med" len="med"/>
+                      <a:tailEnd type="none" w="med" len="med"/>
+                    </a:lnT>
+                    <a:lnB cmpd="sng" algn="ctr" cap="flat" w="19050">
+                      <a:solidFill>
+                        <a:srgbClr val="000000"/>
+                      </a:solidFill>
+                      <a:prstDash val="solid"/>
+                      <a:round/>
+                      <a:headEnd type="none" w="med" len="med"/>
+                      <a:tailEnd type="none" w="med" len="med"/>
+                    </a:lnB>
+                    <a:solidFill>
+                      <a:srgbClr val="FFFFFF"/>
+                    </a:solidFill>
+                  </a:tcPr>
+                </a:tc>
+                <a:tc>
+                  <a:txBody>
+                    <a:bodyPr anchor="t" rtlCol="false"/>
+                    <a:lstStyle/>
+                    <a:p>
+                      <a:pPr algn="l">
+                        <a:lnSpc>
+                          <a:spcPts val="2227"/>
+                        </a:lnSpc>
+                        <a:defRPr/>
+                      </a:pPr>
+                      <a:r>
+                        <a:rPr lang="en-US" sz="1591">
+                          <a:solidFill>
+                            <a:srgbClr val="000000"/>
+                          </a:solidFill>
+                          <a:latin typeface="Agrandir"/>
+                          <a:ea typeface="Agrandir"/>
+                          <a:cs typeface="Agrandir"/>
+                          <a:sym typeface="Agrandir"/>
+                        </a:rPr>
+                        <a:t>2</a:t>
+                      </a:r>
+                      <a:endParaRPr lang="en-US" sz="1100"/>
+                    </a:p>
+                  </a:txBody>
+                  <a:tcPr marL="66675" marR="66675" marT="66675" marB="66675" anchor="ctr">
+                    <a:lnL cmpd="sng" algn="ctr" cap="flat" w="19050">
+                      <a:solidFill>
+                        <a:srgbClr val="000000"/>
+                      </a:solidFill>
+                      <a:prstDash val="solid"/>
+                      <a:round/>
+                      <a:headEnd type="none" w="med" len="med"/>
+                      <a:tailEnd type="none" w="med" len="med"/>
+                    </a:lnL>
+                    <a:lnR cmpd="sng" algn="ctr" cap="flat" w="19050">
+                      <a:solidFill>
+                        <a:srgbClr val="000000"/>
+                      </a:solidFill>
+                      <a:prstDash val="solid"/>
+                      <a:round/>
+                      <a:headEnd type="none" w="med" len="med"/>
+                      <a:tailEnd type="none" w="med" len="med"/>
+                    </a:lnR>
+                    <a:lnT cmpd="sng" algn="ctr" cap="flat" w="19050">
+                      <a:solidFill>
+                        <a:srgbClr val="000000"/>
+                      </a:solidFill>
+                      <a:prstDash val="solid"/>
+                      <a:round/>
+                      <a:headEnd type="none" w="med" len="med"/>
+                      <a:tailEnd type="none" w="med" len="med"/>
+                    </a:lnT>
+                    <a:lnB cmpd="sng" algn="ctr" cap="flat" w="19050">
+                      <a:solidFill>
+                        <a:srgbClr val="000000"/>
+                      </a:solidFill>
+                      <a:prstDash val="solid"/>
+                      <a:round/>
+                      <a:headEnd type="none" w="med" len="med"/>
+                      <a:tailEnd type="none" w="med" len="med"/>
+                    </a:lnB>
+                    <a:solidFill>
+                      <a:srgbClr val="FFFFFF"/>
+                    </a:solidFill>
+                  </a:tcPr>
+                </a:tc>
+                <a:tc>
+                  <a:txBody>
+                    <a:bodyPr anchor="t" rtlCol="false"/>
+                    <a:lstStyle/>
+                    <a:p>
+                      <a:pPr algn="l">
+                        <a:lnSpc>
+                          <a:spcPts val="2227"/>
+                        </a:lnSpc>
+                        <a:defRPr/>
+                      </a:pPr>
+                      <a:r>
+                        <a:rPr lang="en-US" sz="1591">
+                          <a:solidFill>
+                            <a:srgbClr val="000000"/>
+                          </a:solidFill>
+                          <a:latin typeface="Agrandir"/>
+                          <a:ea typeface="Agrandir"/>
+                          <a:cs typeface="Agrandir"/>
+                          <a:sym typeface="Agrandir"/>
+                        </a:rPr>
+                        <a:t>2</a:t>
+                      </a:r>
+                      <a:endParaRPr lang="en-US" sz="1100"/>
+                    </a:p>
+                  </a:txBody>
+                  <a:tcPr marL="66675" marR="66675" marT="66675" marB="66675" anchor="ctr">
+                    <a:lnL cmpd="sng" algn="ctr" cap="flat" w="19050">
+                      <a:solidFill>
+                        <a:srgbClr val="000000"/>
+                      </a:solidFill>
+                      <a:prstDash val="solid"/>
+                      <a:round/>
+                      <a:headEnd type="none" w="med" len="med"/>
+                      <a:tailEnd type="none" w="med" len="med"/>
+                    </a:lnL>
+                    <a:lnR cmpd="sng" algn="ctr" cap="flat" w="19050">
+                      <a:solidFill>
+                        <a:srgbClr val="000000"/>
+                      </a:solidFill>
+                      <a:prstDash val="solid"/>
+                      <a:round/>
+                      <a:headEnd type="none" w="med" len="med"/>
+                      <a:tailEnd type="none" w="med" len="med"/>
+                    </a:lnR>
+                    <a:lnT cmpd="sng" algn="ctr" cap="flat" w="19050">
+                      <a:solidFill>
+                        <a:srgbClr val="000000"/>
+                      </a:solidFill>
+                      <a:prstDash val="solid"/>
+                      <a:round/>
+                      <a:headEnd type="none" w="med" len="med"/>
+                      <a:tailEnd type="none" w="med" len="med"/>
+                    </a:lnT>
+                    <a:lnB cmpd="sng" algn="ctr" cap="flat" w="19050">
+                      <a:solidFill>
+                        <a:srgbClr val="000000"/>
+                      </a:solidFill>
+                      <a:prstDash val="solid"/>
+                      <a:round/>
+                      <a:headEnd type="none" w="med" len="med"/>
+                      <a:tailEnd type="none" w="med" len="med"/>
+                    </a:lnB>
+                    <a:solidFill>
+                      <a:srgbClr val="FFFFFF"/>
+                    </a:solidFill>
+                  </a:tcPr>
+                </a:tc>
+                <a:tc>
+                  <a:txBody>
+                    <a:bodyPr anchor="t" rtlCol="false"/>
+                    <a:lstStyle/>
+                    <a:p>
+                      <a:pPr algn="l">
+                        <a:lnSpc>
+                          <a:spcPts val="2227"/>
+                        </a:lnSpc>
+                        <a:defRPr/>
+                      </a:pPr>
+                      <a:r>
+                        <a:rPr lang="en-US" sz="1591">
+                          <a:solidFill>
+                            <a:srgbClr val="000000"/>
+                          </a:solidFill>
+                          <a:latin typeface="Agrandir"/>
+                          <a:ea typeface="Agrandir"/>
+                          <a:cs typeface="Agrandir"/>
+                          <a:sym typeface="Agrandir"/>
+                        </a:rPr>
+                        <a:t>10</a:t>
+                      </a:r>
+                      <a:endParaRPr lang="en-US" sz="1100"/>
+                    </a:p>
+                  </a:txBody>
+                  <a:tcPr marL="66675" marR="66675" marT="66675" marB="66675" anchor="ctr">
+                    <a:lnL cmpd="sng" algn="ctr" cap="flat" w="19050">
+                      <a:solidFill>
+                        <a:srgbClr val="000000"/>
+                      </a:solidFill>
+                      <a:prstDash val="solid"/>
+                      <a:round/>
+                      <a:headEnd type="none" w="med" len="med"/>
+                      <a:tailEnd type="none" w="med" len="med"/>
+                    </a:lnL>
+                    <a:lnR cmpd="sng" algn="ctr" cap="flat" w="19050">
+                      <a:solidFill>
+                        <a:srgbClr val="000000"/>
+                      </a:solidFill>
+                      <a:prstDash val="solid"/>
+                      <a:round/>
+                      <a:headEnd type="none" w="med" len="med"/>
+                      <a:tailEnd type="none" w="med" len="med"/>
+                    </a:lnR>
+                    <a:lnT cmpd="sng" algn="ctr" cap="flat" w="19050">
+                      <a:solidFill>
+                        <a:srgbClr val="000000"/>
+                      </a:solidFill>
+                      <a:prstDash val="solid"/>
+                      <a:round/>
+                      <a:headEnd type="none" w="med" len="med"/>
+                      <a:tailEnd type="none" w="med" len="med"/>
+                    </a:lnT>
+                    <a:lnB cmpd="sng" algn="ctr" cap="flat" w="19050">
+                      <a:solidFill>
+                        <a:srgbClr val="000000"/>
+                      </a:solidFill>
+                      <a:prstDash val="solid"/>
+                      <a:round/>
+                      <a:headEnd type="none" w="med" len="med"/>
+                      <a:tailEnd type="none" w="med" len="med"/>
+                    </a:lnB>
+                    <a:solidFill>
+                      <a:srgbClr val="FFFFFF"/>
+                    </a:solidFill>
+                  </a:tcPr>
+                </a:tc>
+                <a:tc>
+                  <a:txBody>
+                    <a:bodyPr anchor="t" rtlCol="false"/>
+                    <a:lstStyle/>
+                    <a:p>
+                      <a:pPr algn="l">
+                        <a:lnSpc>
+                          <a:spcPts val="2227"/>
+                        </a:lnSpc>
+                        <a:defRPr/>
+                      </a:pPr>
+                      <a:r>
+                        <a:rPr lang="en-US" sz="1591">
+                          <a:solidFill>
+                            <a:srgbClr val="000000"/>
+                          </a:solidFill>
+                          <a:latin typeface="Agrandir"/>
+                          <a:ea typeface="Agrandir"/>
+                          <a:cs typeface="Agrandir"/>
+                          <a:sym typeface="Agrandir"/>
+                        </a:rPr>
+                        <a:t>(2 + 2) × 10 = </a:t>
+                      </a:r>
+                      <a:r>
+                        <a:rPr lang="en-US" sz="1591" b="true">
+                          <a:solidFill>
+                            <a:srgbClr val="000000"/>
+                          </a:solidFill>
+                          <a:latin typeface="Agrandir Bold"/>
+                          <a:ea typeface="Agrandir Bold"/>
+                          <a:cs typeface="Agrandir Bold"/>
+                          <a:sym typeface="Agrandir Bold"/>
+                        </a:rPr>
+                        <a:t>40</a:t>
+                      </a:r>
+                      <a:endParaRPr lang="en-US" sz="1100"/>
+                    </a:p>
+                  </a:txBody>
+                  <a:tcPr marL="66675" marR="66675" marT="66675" marB="66675" anchor="ctr">
+                    <a:lnL cmpd="sng" algn="ctr" cap="flat" w="19050">
+                      <a:solidFill>
+                        <a:srgbClr val="000000"/>
+                      </a:solidFill>
+                      <a:prstDash val="solid"/>
+                      <a:round/>
+                      <a:headEnd type="none" w="med" len="med"/>
+                      <a:tailEnd type="none" w="med" len="med"/>
+                    </a:lnL>
+                    <a:lnR cmpd="sng" algn="ctr" cap="flat" w="19050">
+                      <a:solidFill>
+                        <a:srgbClr val="000000"/>
+                      </a:solidFill>
+                      <a:prstDash val="solid"/>
+                      <a:round/>
+                      <a:headEnd type="none" w="med" len="med"/>
+                      <a:tailEnd type="none" w="med" len="med"/>
+                    </a:lnR>
+                    <a:lnT cmpd="sng" algn="ctr" cap="flat" w="19050">
+                      <a:solidFill>
+                        <a:srgbClr val="000000"/>
+                      </a:solidFill>
+                      <a:prstDash val="solid"/>
+                      <a:round/>
+                      <a:headEnd type="none" w="med" len="med"/>
+                      <a:tailEnd type="none" w="med" len="med"/>
+                    </a:lnT>
+                    <a:lnB cmpd="sng" algn="ctr" cap="flat" w="19050">
+                      <a:solidFill>
+                        <a:srgbClr val="000000"/>
+                      </a:solidFill>
+                      <a:prstDash val="solid"/>
+                      <a:round/>
+                      <a:headEnd type="none" w="med" len="med"/>
+                      <a:tailEnd type="none" w="med" len="med"/>
+                    </a:lnB>
+                    <a:solidFill>
+                      <a:srgbClr val="FFFFFF"/>
+                    </a:solidFill>
+                  </a:tcPr>
+                </a:tc>
+              </a:tr>
+              <a:tr h="1298147">
+                <a:tc>
+                  <a:txBody>
+                    <a:bodyPr anchor="t" rtlCol="false"/>
+                    <a:lstStyle/>
+                    <a:p>
+                      <a:pPr algn="l">
+                        <a:lnSpc>
+                          <a:spcPts val="2227"/>
+                        </a:lnSpc>
+                        <a:defRPr/>
+                      </a:pPr>
+                      <a:r>
+                        <a:rPr lang="en-US" sz="1591" b="true">
+                          <a:solidFill>
+                            <a:srgbClr val="000000"/>
+                          </a:solidFill>
+                          <a:latin typeface="Agrandir Bold"/>
+                          <a:ea typeface="Agrandir Bold"/>
+                          <a:cs typeface="Agrandir Bold"/>
+                          <a:sym typeface="Agrandir Bold"/>
+                        </a:rPr>
+                        <a:t>Usability</a:t>
+                      </a:r>
+                      <a:endParaRPr lang="en-US" sz="1100"/>
+                    </a:p>
+                  </a:txBody>
+                  <a:tcPr marL="66675" marR="66675" marT="66675" marB="66675" anchor="ctr">
+                    <a:lnL cmpd="sng" algn="ctr" cap="flat" w="19050">
+                      <a:solidFill>
+                        <a:srgbClr val="000000"/>
+                      </a:solidFill>
+                      <a:prstDash val="solid"/>
+                      <a:round/>
+                      <a:headEnd type="none" w="med" len="med"/>
+                      <a:tailEnd type="none" w="med" len="med"/>
+                    </a:lnL>
+                    <a:lnR cmpd="sng" algn="ctr" cap="flat" w="19050">
+                      <a:solidFill>
+                        <a:srgbClr val="000000"/>
+                      </a:solidFill>
+                      <a:prstDash val="solid"/>
+                      <a:round/>
+                      <a:headEnd type="none" w="med" len="med"/>
+                      <a:tailEnd type="none" w="med" len="med"/>
+                    </a:lnR>
+                    <a:lnT cmpd="sng" algn="ctr" cap="flat" w="19050">
+                      <a:solidFill>
+                        <a:srgbClr val="000000"/>
+                      </a:solidFill>
+                      <a:prstDash val="solid"/>
+                      <a:round/>
+                      <a:headEnd type="none" w="med" len="med"/>
+                      <a:tailEnd type="none" w="med" len="med"/>
+                    </a:lnT>
+                    <a:lnB cmpd="sng" algn="ctr" cap="flat" w="19050">
+                      <a:solidFill>
+                        <a:srgbClr val="000000"/>
+                      </a:solidFill>
+                      <a:prstDash val="solid"/>
+                      <a:round/>
+                      <a:headEnd type="none" w="med" len="med"/>
+                      <a:tailEnd type="none" w="med" len="med"/>
+                    </a:lnB>
+                    <a:solidFill>
+                      <a:srgbClr val="F1E3E3"/>
+                    </a:solidFill>
+                  </a:tcPr>
+                </a:tc>
+                <a:tc>
+                  <a:txBody>
+                    <a:bodyPr anchor="t" rtlCol="false"/>
+                    <a:lstStyle/>
+                    <a:p>
+                      <a:pPr algn="l">
+                        <a:lnSpc>
+                          <a:spcPts val="2227"/>
+                        </a:lnSpc>
+                        <a:defRPr/>
+                      </a:pPr>
+                      <a:r>
+                        <a:rPr lang="en-US" sz="1591">
+                          <a:solidFill>
+                            <a:srgbClr val="000000"/>
+                          </a:solidFill>
+                          <a:latin typeface="Agrandir"/>
+                          <a:ea typeface="Agrandir"/>
+                          <a:cs typeface="Agrandir"/>
+                          <a:sym typeface="Agrandir"/>
+                        </a:rPr>
+                        <a:t>Assesses how intuitive and user-friendly the system’s interfaces are for both end users and possibly system administrators, directly impacting user satisfaction and adoption rates.</a:t>
+                      </a:r>
+                      <a:endParaRPr lang="en-US" sz="1100"/>
+                    </a:p>
+                  </a:txBody>
+                  <a:tcPr marL="66675" marR="66675" marT="66675" marB="66675" anchor="ctr">
+                    <a:lnL cmpd="sng" algn="ctr" cap="flat" w="19050">
+                      <a:solidFill>
+                        <a:srgbClr val="000000"/>
+                      </a:solidFill>
+                      <a:prstDash val="solid"/>
+                      <a:round/>
+                      <a:headEnd type="none" w="med" len="med"/>
+                      <a:tailEnd type="none" w="med" len="med"/>
+                    </a:lnL>
+                    <a:lnR cmpd="sng" algn="ctr" cap="flat" w="19050">
+                      <a:solidFill>
+                        <a:srgbClr val="000000"/>
+                      </a:solidFill>
+                      <a:prstDash val="solid"/>
+                      <a:round/>
+                      <a:headEnd type="none" w="med" len="med"/>
+                      <a:tailEnd type="none" w="med" len="med"/>
+                    </a:lnR>
+                    <a:lnT cmpd="sng" algn="ctr" cap="flat" w="19050">
+                      <a:solidFill>
+                        <a:srgbClr val="000000"/>
+                      </a:solidFill>
+                      <a:prstDash val="solid"/>
+                      <a:round/>
+                      <a:headEnd type="none" w="med" len="med"/>
+                      <a:tailEnd type="none" w="med" len="med"/>
+                    </a:lnT>
+                    <a:lnB cmpd="sng" algn="ctr" cap="flat" w="19050">
+                      <a:solidFill>
+                        <a:srgbClr val="000000"/>
+                      </a:solidFill>
+                      <a:prstDash val="solid"/>
+                      <a:round/>
+                      <a:headEnd type="none" w="med" len="med"/>
+                      <a:tailEnd type="none" w="med" len="med"/>
+                    </a:lnB>
+                    <a:solidFill>
+                      <a:srgbClr val="FFFFFF"/>
+                    </a:solidFill>
+                  </a:tcPr>
+                </a:tc>
+                <a:tc>
+                  <a:txBody>
+                    <a:bodyPr anchor="t" rtlCol="false"/>
+                    <a:lstStyle/>
+                    <a:p>
+                      <a:pPr algn="l">
+                        <a:lnSpc>
+                          <a:spcPts val="2227"/>
+                        </a:lnSpc>
+                        <a:defRPr/>
+                      </a:pPr>
+                      <a:r>
+                        <a:rPr lang="en-US" sz="1591">
+                          <a:solidFill>
+                            <a:srgbClr val="000000"/>
+                          </a:solidFill>
+                          <a:latin typeface="Agrandir"/>
+                          <a:ea typeface="Agrandir"/>
+                          <a:cs typeface="Agrandir"/>
+                          <a:sym typeface="Agrandir"/>
+                        </a:rPr>
+                        <a:t>- User satisfaction surveys ≥ 4/5- Task completion rate in usability tests</a:t>
+                      </a:r>
+                      <a:endParaRPr lang="en-US" sz="1100"/>
+                    </a:p>
+                  </a:txBody>
+                  <a:tcPr marL="66675" marR="66675" marT="66675" marB="66675" anchor="ctr">
+                    <a:lnL cmpd="sng" algn="ctr" cap="flat" w="19050">
+                      <a:solidFill>
+                        <a:srgbClr val="000000"/>
+                      </a:solidFill>
+                      <a:prstDash val="solid"/>
+                      <a:round/>
+                      <a:headEnd type="none" w="med" len="med"/>
+                      <a:tailEnd type="none" w="med" len="med"/>
+                    </a:lnL>
+                    <a:lnR cmpd="sng" algn="ctr" cap="flat" w="19050">
+                      <a:solidFill>
+                        <a:srgbClr val="000000"/>
+                      </a:solidFill>
+                      <a:prstDash val="solid"/>
+                      <a:round/>
+                      <a:headEnd type="none" w="med" len="med"/>
+                      <a:tailEnd type="none" w="med" len="med"/>
+                    </a:lnR>
+                    <a:lnT cmpd="sng" algn="ctr" cap="flat" w="19050">
+                      <a:solidFill>
+                        <a:srgbClr val="000000"/>
+                      </a:solidFill>
+                      <a:prstDash val="solid"/>
+                      <a:round/>
+                      <a:headEnd type="none" w="med" len="med"/>
+                      <a:tailEnd type="none" w="med" len="med"/>
+                    </a:lnT>
+                    <a:lnB cmpd="sng" algn="ctr" cap="flat" w="19050">
+                      <a:solidFill>
+                        <a:srgbClr val="000000"/>
+                      </a:solidFill>
+                      <a:prstDash val="solid"/>
+                      <a:round/>
+                      <a:headEnd type="none" w="med" len="med"/>
+                      <a:tailEnd type="none" w="med" len="med"/>
+                    </a:lnB>
+                    <a:solidFill>
+                      <a:srgbClr val="FFFFFF"/>
+                    </a:solidFill>
+                  </a:tcPr>
+                </a:tc>
+                <a:tc>
+                  <a:txBody>
+                    <a:bodyPr anchor="t" rtlCol="false"/>
+                    <a:lstStyle/>
+                    <a:p>
+                      <a:pPr algn="l">
                         <a:lnSpc>
                           <a:spcPts val="2227"/>
                         </a:lnSpc>
@@ -15471,7 +17374,7 @@
                       <a:endParaRPr lang="en-US" sz="1100"/>
                     </a:p>
                   </a:txBody>
-                  <a:tcPr marL="76200" marR="76200" marT="76200" marB="76200" anchor="ctr">
+                  <a:tcPr marL="66675" marR="66675" marT="66675" marB="66675" anchor="ctr">
                     <a:lnL cmpd="sng" algn="ctr" cap="flat" w="19050">
                       <a:solidFill>
                         <a:srgbClr val="000000"/>
@@ -15518,7 +17421,7 @@
                     <a:bodyPr anchor="t" rtlCol="false"/>
                     <a:lstStyle/>
                     <a:p>
-                      <a:pPr algn="ctr">
+                      <a:pPr algn="l">
                         <a:lnSpc>
                           <a:spcPts val="2227"/>
                         </a:lnSpc>
@@ -15539,7 +17442,7 @@
                       <a:endParaRPr lang="en-US" sz="1100"/>
                     </a:p>
                   </a:txBody>
-                  <a:tcPr marL="76200" marR="76200" marT="76200" marB="76200" anchor="ctr">
+                  <a:tcPr marL="66675" marR="66675" marT="66675" marB="66675" anchor="ctr">
                     <a:lnL cmpd="sng" algn="ctr" cap="flat" w="19050">
                       <a:solidFill>
                         <a:srgbClr val="000000"/>
@@ -15586,7 +17489,7 @@
                     <a:bodyPr anchor="t" rtlCol="false"/>
                     <a:lstStyle/>
                     <a:p>
-                      <a:pPr algn="ctr">
+                      <a:pPr algn="l">
                         <a:lnSpc>
                           <a:spcPts val="2227"/>
                         </a:lnSpc>
@@ -15602,12 +17505,12 @@
                           <a:cs typeface="Agrandir"/>
                           <a:sym typeface="Agrandir"/>
                         </a:rPr>
-                        <a:t>25</a:t>
+                        <a:t>15</a:t>
                       </a:r>
                       <a:endParaRPr lang="en-US" sz="1100"/>
                     </a:p>
                   </a:txBody>
-                  <a:tcPr marL="76200" marR="76200" marT="76200" marB="76200" anchor="ctr">
+                  <a:tcPr marL="66675" marR="66675" marT="66675" marB="66675" anchor="ctr">
                     <a:lnL cmpd="sng" algn="ctr" cap="flat" w="19050">
                       <a:solidFill>
                         <a:srgbClr val="000000"/>
@@ -15670,7 +17573,7 @@
                           <a:cs typeface="Agrandir"/>
                           <a:sym typeface="Agrandir"/>
                         </a:rPr>
-                        <a:t>(3 + 2) × 25 =</a:t>
+                        <a:t>(3 + 2) × 15 = </a:t>
                       </a:r>
                       <a:r>
                         <a:rPr lang="en-US" sz="1591" b="true">
@@ -15682,12 +17585,12 @@
                           <a:cs typeface="Agrandir Bold"/>
                           <a:sym typeface="Agrandir Bold"/>
                         </a:rPr>
-                        <a:t> 125</a:t>
+                        <a:t>75</a:t>
                       </a:r>
                       <a:endParaRPr lang="en-US" sz="1100"/>
                     </a:p>
                   </a:txBody>
-                  <a:tcPr marL="76200" marR="76200" marT="76200" marB="76200" anchor="ctr">
+                  <a:tcPr marL="66675" marR="66675" marT="66675" marB="66675" anchor="ctr">
                     <a:lnL cmpd="sng" algn="ctr" cap="flat" w="19050">
                       <a:solidFill>
                         <a:srgbClr val="000000"/>
@@ -15730,7 +17633,7 @@
                   </a:tcPr>
                 </a:tc>
               </a:tr>
-              <a:tr h="1317281">
+              <a:tr h="1021337">
                 <a:tc>
                   <a:txBody>
                     <a:bodyPr anchor="t" rtlCol="false"/>
@@ -15752,12 +17655,12 @@
                           <a:cs typeface="Agrandir Bold"/>
                           <a:sym typeface="Agrandir Bold"/>
                         </a:rPr>
-                        <a:t>Scalability</a:t>
+                        <a:t>Availability</a:t>
                       </a:r>
                       <a:endParaRPr lang="en-US" sz="1100"/>
                     </a:p>
                   </a:txBody>
-                  <a:tcPr marL="76200" marR="76200" marT="76200" marB="76200" anchor="ctr">
+                  <a:tcPr marL="66675" marR="66675" marT="66675" marB="66675" anchor="ctr">
                     <a:lnL cmpd="sng" algn="ctr" cap="flat" w="19050">
                       <a:solidFill>
                         <a:srgbClr val="000000"/>
@@ -15820,15 +17723,63 @@
                           <a:cs typeface="Agrandir"/>
                           <a:sym typeface="Agrandir"/>
                         </a:rPr>
-                        <a:t>Assesses the system’s capacity to handle significant increases in user and dish volume without noticeable performance</a:t>
+                        <a:t>Reflects the readiness of the system to serve recommendations whenever requested, minimizing downtime that disrupts user or business operations.</a:t>
                       </a:r>
                       <a:endParaRPr lang="en-US" sz="1100"/>
                     </a:p>
+                  </a:txBody>
+                  <a:tcPr marL="66675" marR="66675" marT="66675" marB="66675" anchor="ctr">
+                    <a:lnL cmpd="sng" algn="ctr" cap="flat" w="19050">
+                      <a:solidFill>
+                        <a:srgbClr val="000000"/>
+                      </a:solidFill>
+                      <a:prstDash val="solid"/>
+                      <a:round/>
+                      <a:headEnd type="none" w="med" len="med"/>
+                      <a:tailEnd type="none" w="med" len="med"/>
+                    </a:lnL>
+                    <a:lnR cmpd="sng" algn="ctr" cap="flat" w="19050">
+                      <a:solidFill>
+                        <a:srgbClr val="000000"/>
+                      </a:solidFill>
+                      <a:prstDash val="solid"/>
+                      <a:round/>
+                      <a:headEnd type="none" w="med" len="med"/>
+                      <a:tailEnd type="none" w="med" len="med"/>
+                    </a:lnR>
+                    <a:lnT cmpd="sng" algn="ctr" cap="flat" w="19050">
+                      <a:solidFill>
+                        <a:srgbClr val="000000"/>
+                      </a:solidFill>
+                      <a:prstDash val="solid"/>
+                      <a:round/>
+                      <a:headEnd type="none" w="med" len="med"/>
+                      <a:tailEnd type="none" w="med" len="med"/>
+                    </a:lnT>
+                    <a:lnB cmpd="sng" algn="ctr" cap="flat" w="19050">
+                      <a:solidFill>
+                        <a:srgbClr val="000000"/>
+                      </a:solidFill>
+                      <a:prstDash val="solid"/>
+                      <a:round/>
+                      <a:headEnd type="none" w="med" len="med"/>
+                      <a:tailEnd type="none" w="med" len="med"/>
+                    </a:lnB>
+                    <a:solidFill>
+                      <a:srgbClr val="FFFFFF"/>
+                    </a:solidFill>
+                  </a:tcPr>
+                </a:tc>
+                <a:tc>
+                  <a:txBody>
+                    <a:bodyPr anchor="t" rtlCol="false"/>
+                    <a:lstStyle/>
                     <a:p>
                       <a:pPr algn="l">
                         <a:lnSpc>
                           <a:spcPts val="2227"/>
                         </a:lnSpc>
+                        <a:defRPr/>
                       </a:pPr>
                       <a:r>
                         <a:rPr lang="en-US" sz="1591">
@@ -15840,11 +17791,12 @@
                           <a:cs typeface="Agrandir"/>
                           <a:sym typeface="Agrandir"/>
                         </a:rPr>
-                        <a:t>  degradation.</a:t>
+                        <a:t>- System uptime ≥ 99.9% (monthly)- Average recovery time after a crash/outage</a:t>
                       </a:r>
+                      <a:endParaRPr lang="en-US" sz="1100"/>
                     </a:p>
                   </a:txBody>
-                  <a:tcPr marL="76200" marR="76200" marT="76200" marB="76200" anchor="ctr">
+                  <a:tcPr marL="66675" marR="66675" marT="66675" marB="66675" anchor="ctr">
                     <a:lnL cmpd="sng" algn="ctr" cap="flat" w="19050">
                       <a:solidFill>
                         <a:srgbClr val="000000"/>
@@ -15907,31 +17859,12 @@
                           <a:cs typeface="Agrandir"/>
                           <a:sym typeface="Agrandir"/>
                         </a:rPr>
-                        <a:t>Ability to scale up to 10× load with minimal</a:t>
+                        <a:t>2</a:t>
                       </a:r>
                       <a:endParaRPr lang="en-US" sz="1100"/>
                     </a:p>
-                    <a:p>
-                      <a:pPr algn="l">
-                        <a:lnSpc>
-                          <a:spcPts val="2227"/>
-                        </a:lnSpc>
-                      </a:pPr>
-                      <a:r>
-                        <a:rPr lang="en-US" sz="1591">
-                          <a:solidFill>
-                            <a:srgbClr val="000000"/>
-                          </a:solidFill>
-                          <a:latin typeface="Agrandir"/>
-                          <a:ea typeface="Agrandir"/>
-                          <a:cs typeface="Agrandir"/>
-                          <a:sym typeface="Agrandir"/>
-                        </a:rPr>
-                        <a:t>  performance loss</a:t>
-                      </a:r>
-                    </a:p>
                   </a:txBody>
-                  <a:tcPr marL="76200" marR="76200" marT="76200" marB="76200" anchor="ctr">
+                  <a:tcPr marL="66675" marR="66675" marT="66675" marB="66675" anchor="ctr">
                     <a:lnL cmpd="sng" algn="ctr" cap="flat" w="19050">
                       <a:solidFill>
                         <a:srgbClr val="000000"/>
@@ -15978,7 +17911,7 @@
                     <a:bodyPr anchor="t" rtlCol="false"/>
                     <a:lstStyle/>
                     <a:p>
-                      <a:pPr algn="ctr">
+                      <a:pPr algn="l">
                         <a:lnSpc>
                           <a:spcPts val="2227"/>
                         </a:lnSpc>
@@ -15999,7 +17932,7 @@
                       <a:endParaRPr lang="en-US" sz="1100"/>
                     </a:p>
                   </a:txBody>
-                  <a:tcPr marL="76200" marR="76200" marT="76200" marB="76200" anchor="ctr">
+                  <a:tcPr marL="66675" marR="66675" marT="66675" marB="66675" anchor="ctr">
                     <a:lnL cmpd="sng" algn="ctr" cap="flat" w="19050">
                       <a:solidFill>
                         <a:srgbClr val="000000"/>
@@ -16046,584 +17979,7 @@
                     <a:bodyPr anchor="t" rtlCol="false"/>
                     <a:lstStyle/>
                     <a:p>
-                      <a:pPr algn="ctr">
-                        <a:lnSpc>
-                          <a:spcPts val="2227"/>
-                        </a:lnSpc>
-                        <a:defRPr/>
-                      </a:pPr>
-                      <a:r>
-                        <a:rPr lang="en-US" sz="1591">
-                          <a:solidFill>
-                            <a:srgbClr val="000000"/>
-                          </a:solidFill>
-                          <a:latin typeface="Agrandir"/>
-                          <a:ea typeface="Agrandir"/>
-                          <a:cs typeface="Agrandir"/>
-                          <a:sym typeface="Agrandir"/>
-                        </a:rPr>
-                        <a:t>3</a:t>
-                      </a:r>
-                      <a:endParaRPr lang="en-US" sz="1100"/>
-                    </a:p>
-                  </a:txBody>
-                  <a:tcPr marL="76200" marR="76200" marT="76200" marB="76200" anchor="ctr">
-                    <a:lnL cmpd="sng" algn="ctr" cap="flat" w="19050">
-                      <a:solidFill>
-                        <a:srgbClr val="000000"/>
-                      </a:solidFill>
-                      <a:prstDash val="solid"/>
-                      <a:round/>
-                      <a:headEnd type="none" w="med" len="med"/>
-                      <a:tailEnd type="none" w="med" len="med"/>
-                    </a:lnL>
-                    <a:lnR cmpd="sng" algn="ctr" cap="flat" w="19050">
-                      <a:solidFill>
-                        <a:srgbClr val="000000"/>
-                      </a:solidFill>
-                      <a:prstDash val="solid"/>
-                      <a:round/>
-                      <a:headEnd type="none" w="med" len="med"/>
-                      <a:tailEnd type="none" w="med" len="med"/>
-                    </a:lnR>
-                    <a:lnT cmpd="sng" algn="ctr" cap="flat" w="19050">
-                      <a:solidFill>
-                        <a:srgbClr val="000000"/>
-                      </a:solidFill>
-                      <a:prstDash val="solid"/>
-                      <a:round/>
-                      <a:headEnd type="none" w="med" len="med"/>
-                      <a:tailEnd type="none" w="med" len="med"/>
-                    </a:lnT>
-                    <a:lnB cmpd="sng" algn="ctr" cap="flat" w="19050">
-                      <a:solidFill>
-                        <a:srgbClr val="000000"/>
-                      </a:solidFill>
-                      <a:prstDash val="solid"/>
-                      <a:round/>
-                      <a:headEnd type="none" w="med" len="med"/>
-                      <a:tailEnd type="none" w="med" len="med"/>
-                    </a:lnB>
-                    <a:solidFill>
-                      <a:srgbClr val="FFFFFF"/>
-                    </a:solidFill>
-                  </a:tcPr>
-                </a:tc>
-                <a:tc>
-                  <a:txBody>
-                    <a:bodyPr anchor="t" rtlCol="false"/>
-                    <a:lstStyle/>
-                    <a:p>
-                      <a:pPr algn="ctr">
-                        <a:lnSpc>
-                          <a:spcPts val="2227"/>
-                        </a:lnSpc>
-                        <a:defRPr/>
-                      </a:pPr>
-                      <a:r>
-                        <a:rPr lang="en-US" sz="1591">
-                          <a:solidFill>
-                            <a:srgbClr val="000000"/>
-                          </a:solidFill>
-                          <a:latin typeface="Agrandir"/>
-                          <a:ea typeface="Agrandir"/>
-                          <a:cs typeface="Agrandir"/>
-                          <a:sym typeface="Agrandir"/>
-                        </a:rPr>
-                        <a:t>20</a:t>
-                      </a:r>
-                      <a:endParaRPr lang="en-US" sz="1100"/>
-                    </a:p>
-                  </a:txBody>
-                  <a:tcPr marL="76200" marR="76200" marT="76200" marB="76200" anchor="ctr">
-                    <a:lnL cmpd="sng" algn="ctr" cap="flat" w="19050">
-                      <a:solidFill>
-                        <a:srgbClr val="000000"/>
-                      </a:solidFill>
-                      <a:prstDash val="solid"/>
-                      <a:round/>
-                      <a:headEnd type="none" w="med" len="med"/>
-                      <a:tailEnd type="none" w="med" len="med"/>
-                    </a:lnL>
-                    <a:lnR cmpd="sng" algn="ctr" cap="flat" w="19050">
-                      <a:solidFill>
-                        <a:srgbClr val="000000"/>
-                      </a:solidFill>
-                      <a:prstDash val="solid"/>
-                      <a:round/>
-                      <a:headEnd type="none" w="med" len="med"/>
-                      <a:tailEnd type="none" w="med" len="med"/>
-                    </a:lnR>
-                    <a:lnT cmpd="sng" algn="ctr" cap="flat" w="19050">
-                      <a:solidFill>
-                        <a:srgbClr val="000000"/>
-                      </a:solidFill>
-                      <a:prstDash val="solid"/>
-                      <a:round/>
-                      <a:headEnd type="none" w="med" len="med"/>
-                      <a:tailEnd type="none" w="med" len="med"/>
-                    </a:lnT>
-                    <a:lnB cmpd="sng" algn="ctr" cap="flat" w="19050">
-                      <a:solidFill>
-                        <a:srgbClr val="000000"/>
-                      </a:solidFill>
-                      <a:prstDash val="solid"/>
-                      <a:round/>
-                      <a:headEnd type="none" w="med" len="med"/>
-                      <a:tailEnd type="none" w="med" len="med"/>
-                    </a:lnB>
-                    <a:solidFill>
-                      <a:srgbClr val="FFFFFF"/>
-                    </a:solidFill>
-                  </a:tcPr>
-                </a:tc>
-                <a:tc>
-                  <a:txBody>
-                    <a:bodyPr anchor="t" rtlCol="false"/>
-                    <a:lstStyle/>
-                    <a:p>
                       <a:pPr algn="l">
-                        <a:lnSpc>
-                          <a:spcPts val="2227"/>
-                        </a:lnSpc>
-                        <a:defRPr/>
-                      </a:pPr>
-                      <a:r>
-                        <a:rPr lang="en-US" sz="1591">
-                          <a:solidFill>
-                            <a:srgbClr val="000000"/>
-                          </a:solidFill>
-                          <a:latin typeface="Agrandir"/>
-                          <a:ea typeface="Agrandir"/>
-                          <a:cs typeface="Agrandir"/>
-                          <a:sym typeface="Agrandir"/>
-                        </a:rPr>
-                        <a:t>(3 + 3) × 20 = </a:t>
-                      </a:r>
-                      <a:r>
-                        <a:rPr lang="en-US" sz="1591" b="true">
-                          <a:solidFill>
-                            <a:srgbClr val="000000"/>
-                          </a:solidFill>
-                          <a:latin typeface="Agrandir Bold"/>
-                          <a:ea typeface="Agrandir Bold"/>
-                          <a:cs typeface="Agrandir Bold"/>
-                          <a:sym typeface="Agrandir Bold"/>
-                        </a:rPr>
-                        <a:t>120</a:t>
-                      </a:r>
-                      <a:endParaRPr lang="en-US" sz="1100"/>
-                    </a:p>
-                  </a:txBody>
-                  <a:tcPr marL="76200" marR="76200" marT="76200" marB="76200" anchor="ctr">
-                    <a:lnL cmpd="sng" algn="ctr" cap="flat" w="19050">
-                      <a:solidFill>
-                        <a:srgbClr val="000000"/>
-                      </a:solidFill>
-                      <a:prstDash val="solid"/>
-                      <a:round/>
-                      <a:headEnd type="none" w="med" len="med"/>
-                      <a:tailEnd type="none" w="med" len="med"/>
-                    </a:lnL>
-                    <a:lnR cmpd="sng" algn="ctr" cap="flat" w="19050">
-                      <a:solidFill>
-                        <a:srgbClr val="000000"/>
-                      </a:solidFill>
-                      <a:prstDash val="solid"/>
-                      <a:round/>
-                      <a:headEnd type="none" w="med" len="med"/>
-                      <a:tailEnd type="none" w="med" len="med"/>
-                    </a:lnR>
-                    <a:lnT cmpd="sng" algn="ctr" cap="flat" w="19050">
-                      <a:solidFill>
-                        <a:srgbClr val="000000"/>
-                      </a:solidFill>
-                      <a:prstDash val="solid"/>
-                      <a:round/>
-                      <a:headEnd type="none" w="med" len="med"/>
-                      <a:tailEnd type="none" w="med" len="med"/>
-                    </a:lnT>
-                    <a:lnB cmpd="sng" algn="ctr" cap="flat" w="19050">
-                      <a:solidFill>
-                        <a:srgbClr val="000000"/>
-                      </a:solidFill>
-                      <a:prstDash val="solid"/>
-                      <a:round/>
-                      <a:headEnd type="none" w="med" len="med"/>
-                      <a:tailEnd type="none" w="med" len="med"/>
-                    </a:lnB>
-                    <a:solidFill>
-                      <a:srgbClr val="FFFFFF"/>
-                    </a:solidFill>
-                  </a:tcPr>
-                </a:tc>
-              </a:tr>
-              <a:tr h="1317281">
-                <a:tc>
-                  <a:txBody>
-                    <a:bodyPr anchor="t" rtlCol="false"/>
-                    <a:lstStyle/>
-                    <a:p>
-                      <a:pPr algn="l">
-                        <a:lnSpc>
-                          <a:spcPts val="2227"/>
-                        </a:lnSpc>
-                        <a:defRPr/>
-                      </a:pPr>
-                      <a:r>
-                        <a:rPr lang="en-US" sz="1591" b="true">
-                          <a:solidFill>
-                            <a:srgbClr val="000000"/>
-                          </a:solidFill>
-                          <a:latin typeface="Agrandir Bold"/>
-                          <a:ea typeface="Agrandir Bold"/>
-                          <a:cs typeface="Agrandir Bold"/>
-                          <a:sym typeface="Agrandir Bold"/>
-                        </a:rPr>
-                        <a:t>Cold Start Handling</a:t>
-                      </a:r>
-                      <a:endParaRPr lang="en-US" sz="1100"/>
-                    </a:p>
-                  </a:txBody>
-                  <a:tcPr marL="76200" marR="76200" marT="76200" marB="76200" anchor="ctr">
-                    <a:lnL cmpd="sng" algn="ctr" cap="flat" w="19050">
-                      <a:solidFill>
-                        <a:srgbClr val="000000"/>
-                      </a:solidFill>
-                      <a:prstDash val="solid"/>
-                      <a:round/>
-                      <a:headEnd type="none" w="med" len="med"/>
-                      <a:tailEnd type="none" w="med" len="med"/>
-                    </a:lnL>
-                    <a:lnR cmpd="sng" algn="ctr" cap="flat" w="19050">
-                      <a:solidFill>
-                        <a:srgbClr val="000000"/>
-                      </a:solidFill>
-                      <a:prstDash val="solid"/>
-                      <a:round/>
-                      <a:headEnd type="none" w="med" len="med"/>
-                      <a:tailEnd type="none" w="med" len="med"/>
-                    </a:lnR>
-                    <a:lnT cmpd="sng" algn="ctr" cap="flat" w="19050">
-                      <a:solidFill>
-                        <a:srgbClr val="000000"/>
-                      </a:solidFill>
-                      <a:prstDash val="solid"/>
-                      <a:round/>
-                      <a:headEnd type="none" w="med" len="med"/>
-                      <a:tailEnd type="none" w="med" len="med"/>
-                    </a:lnT>
-                    <a:lnB cmpd="sng" algn="ctr" cap="flat" w="19050">
-                      <a:solidFill>
-                        <a:srgbClr val="000000"/>
-                      </a:solidFill>
-                      <a:prstDash val="solid"/>
-                      <a:round/>
-                      <a:headEnd type="none" w="med" len="med"/>
-                      <a:tailEnd type="none" w="med" len="med"/>
-                    </a:lnB>
-                    <a:solidFill>
-                      <a:srgbClr val="F1E3E3"/>
-                    </a:solidFill>
-                  </a:tcPr>
-                </a:tc>
-                <a:tc>
-                  <a:txBody>
-                    <a:bodyPr anchor="t" rtlCol="false"/>
-                    <a:lstStyle/>
-                    <a:p>
-                      <a:pPr algn="l">
-                        <a:lnSpc>
-                          <a:spcPts val="2227"/>
-                        </a:lnSpc>
-                        <a:defRPr/>
-                      </a:pPr>
-                      <a:r>
-                        <a:rPr lang="en-US" sz="1591">
-                          <a:solidFill>
-                            <a:srgbClr val="000000"/>
-                          </a:solidFill>
-                          <a:latin typeface="Agrandir"/>
-                          <a:ea typeface="Agrandir"/>
-                          <a:cs typeface="Agrandir"/>
-                          <a:sym typeface="Agrandir"/>
-                        </a:rPr>
-                        <a:t>Reviews the system’s effectiveness in generating relevant recommendations for new users or dishes with minimal historical data.</a:t>
-                      </a:r>
-                      <a:endParaRPr lang="en-US" sz="1100"/>
-                    </a:p>
-                  </a:txBody>
-                  <a:tcPr marL="76200" marR="76200" marT="76200" marB="76200" anchor="ctr">
-                    <a:lnL cmpd="sng" algn="ctr" cap="flat" w="19050">
-                      <a:solidFill>
-                        <a:srgbClr val="000000"/>
-                      </a:solidFill>
-                      <a:prstDash val="solid"/>
-                      <a:round/>
-                      <a:headEnd type="none" w="med" len="med"/>
-                      <a:tailEnd type="none" w="med" len="med"/>
-                    </a:lnL>
-                    <a:lnR cmpd="sng" algn="ctr" cap="flat" w="19050">
-                      <a:solidFill>
-                        <a:srgbClr val="000000"/>
-                      </a:solidFill>
-                      <a:prstDash val="solid"/>
-                      <a:round/>
-                      <a:headEnd type="none" w="med" len="med"/>
-                      <a:tailEnd type="none" w="med" len="med"/>
-                    </a:lnR>
-                    <a:lnT cmpd="sng" algn="ctr" cap="flat" w="19050">
-                      <a:solidFill>
-                        <a:srgbClr val="000000"/>
-                      </a:solidFill>
-                      <a:prstDash val="solid"/>
-                      <a:round/>
-                      <a:headEnd type="none" w="med" len="med"/>
-                      <a:tailEnd type="none" w="med" len="med"/>
-                    </a:lnT>
-                    <a:lnB cmpd="sng" algn="ctr" cap="flat" w="19050">
-                      <a:solidFill>
-                        <a:srgbClr val="000000"/>
-                      </a:solidFill>
-                      <a:prstDash val="solid"/>
-                      <a:round/>
-                      <a:headEnd type="none" w="med" len="med"/>
-                      <a:tailEnd type="none" w="med" len="med"/>
-                    </a:lnB>
-                    <a:solidFill>
-                      <a:srgbClr val="FFFFFF"/>
-                    </a:solidFill>
-                  </a:tcPr>
-                </a:tc>
-                <a:tc>
-                  <a:txBody>
-                    <a:bodyPr anchor="t" rtlCol="false"/>
-                    <a:lstStyle/>
-                    <a:p>
-                      <a:pPr algn="l">
-                        <a:lnSpc>
-                          <a:spcPts val="2227"/>
-                        </a:lnSpc>
-                        <a:defRPr/>
-                      </a:pPr>
-                      <a:r>
-                        <a:rPr lang="en-US" sz="1591">
-                          <a:solidFill>
-                            <a:srgbClr val="000000"/>
-                          </a:solidFill>
-                          <a:latin typeface="Agrandir"/>
-                          <a:ea typeface="Agrandir"/>
-                          <a:cs typeface="Agrandir"/>
-                          <a:sym typeface="Agrandir"/>
-                        </a:rPr>
-                        <a:t>Effective</a:t>
-                      </a:r>
-                      <a:endParaRPr lang="en-US" sz="1100"/>
-                    </a:p>
-                    <a:p>
-                      <a:pPr algn="l">
-                        <a:lnSpc>
-                          <a:spcPts val="2227"/>
-                        </a:lnSpc>
-                      </a:pPr>
-                      <a:r>
-                        <a:rPr lang="en-US" sz="1591">
-                          <a:solidFill>
-                            <a:srgbClr val="000000"/>
-                          </a:solidFill>
-                          <a:latin typeface="Agrandir"/>
-                          <a:ea typeface="Agrandir"/>
-                          <a:cs typeface="Agrandir"/>
-                          <a:sym typeface="Agrandir"/>
-                        </a:rPr>
-                        <a:t>  performance with fewer than 100 interactions</a:t>
-                      </a:r>
-                    </a:p>
-                  </a:txBody>
-                  <a:tcPr marL="76200" marR="76200" marT="76200" marB="76200" anchor="ctr">
-                    <a:lnL cmpd="sng" algn="ctr" cap="flat" w="19050">
-                      <a:solidFill>
-                        <a:srgbClr val="000000"/>
-                      </a:solidFill>
-                      <a:prstDash val="solid"/>
-                      <a:round/>
-                      <a:headEnd type="none" w="med" len="med"/>
-                      <a:tailEnd type="none" w="med" len="med"/>
-                    </a:lnL>
-                    <a:lnR cmpd="sng" algn="ctr" cap="flat" w="19050">
-                      <a:solidFill>
-                        <a:srgbClr val="000000"/>
-                      </a:solidFill>
-                      <a:prstDash val="solid"/>
-                      <a:round/>
-                      <a:headEnd type="none" w="med" len="med"/>
-                      <a:tailEnd type="none" w="med" len="med"/>
-                    </a:lnR>
-                    <a:lnT cmpd="sng" algn="ctr" cap="flat" w="19050">
-                      <a:solidFill>
-                        <a:srgbClr val="000000"/>
-                      </a:solidFill>
-                      <a:prstDash val="solid"/>
-                      <a:round/>
-                      <a:headEnd type="none" w="med" len="med"/>
-                      <a:tailEnd type="none" w="med" len="med"/>
-                    </a:lnT>
-                    <a:lnB cmpd="sng" algn="ctr" cap="flat" w="19050">
-                      <a:solidFill>
-                        <a:srgbClr val="000000"/>
-                      </a:solidFill>
-                      <a:prstDash val="solid"/>
-                      <a:round/>
-                      <a:headEnd type="none" w="med" len="med"/>
-                      <a:tailEnd type="none" w="med" len="med"/>
-                    </a:lnB>
-                    <a:solidFill>
-                      <a:srgbClr val="FFFFFF"/>
-                    </a:solidFill>
-                  </a:tcPr>
-                </a:tc>
-                <a:tc>
-                  <a:txBody>
-                    <a:bodyPr anchor="t" rtlCol="false"/>
-                    <a:lstStyle/>
-                    <a:p>
-                      <a:pPr algn="ctr">
-                        <a:lnSpc>
-                          <a:spcPts val="2227"/>
-                        </a:lnSpc>
-                        <a:defRPr/>
-                      </a:pPr>
-                      <a:r>
-                        <a:rPr lang="en-US" sz="1591">
-                          <a:solidFill>
-                            <a:srgbClr val="000000"/>
-                          </a:solidFill>
-                          <a:latin typeface="Agrandir"/>
-                          <a:ea typeface="Agrandir"/>
-                          <a:cs typeface="Agrandir"/>
-                          <a:sym typeface="Agrandir"/>
-                        </a:rPr>
-                        <a:t>2</a:t>
-                      </a:r>
-                      <a:endParaRPr lang="en-US" sz="1100"/>
-                    </a:p>
-                  </a:txBody>
-                  <a:tcPr marL="76200" marR="76200" marT="76200" marB="76200" anchor="ctr">
-                    <a:lnL cmpd="sng" algn="ctr" cap="flat" w="19050">
-                      <a:solidFill>
-                        <a:srgbClr val="000000"/>
-                      </a:solidFill>
-                      <a:prstDash val="solid"/>
-                      <a:round/>
-                      <a:headEnd type="none" w="med" len="med"/>
-                      <a:tailEnd type="none" w="med" len="med"/>
-                    </a:lnL>
-                    <a:lnR cmpd="sng" algn="ctr" cap="flat" w="19050">
-                      <a:solidFill>
-                        <a:srgbClr val="000000"/>
-                      </a:solidFill>
-                      <a:prstDash val="solid"/>
-                      <a:round/>
-                      <a:headEnd type="none" w="med" len="med"/>
-                      <a:tailEnd type="none" w="med" len="med"/>
-                    </a:lnR>
-                    <a:lnT cmpd="sng" algn="ctr" cap="flat" w="19050">
-                      <a:solidFill>
-                        <a:srgbClr val="000000"/>
-                      </a:solidFill>
-                      <a:prstDash val="solid"/>
-                      <a:round/>
-                      <a:headEnd type="none" w="med" len="med"/>
-                      <a:tailEnd type="none" w="med" len="med"/>
-                    </a:lnT>
-                    <a:lnB cmpd="sng" algn="ctr" cap="flat" w="19050">
-                      <a:solidFill>
-                        <a:srgbClr val="000000"/>
-                      </a:solidFill>
-                      <a:prstDash val="solid"/>
-                      <a:round/>
-                      <a:headEnd type="none" w="med" len="med"/>
-                      <a:tailEnd type="none" w="med" len="med"/>
-                    </a:lnB>
-                    <a:solidFill>
-                      <a:srgbClr val="FFFFFF"/>
-                    </a:solidFill>
-                  </a:tcPr>
-                </a:tc>
-                <a:tc>
-                  <a:txBody>
-                    <a:bodyPr anchor="t" rtlCol="false"/>
-                    <a:lstStyle/>
-                    <a:p>
-                      <a:pPr algn="ctr">
-                        <a:lnSpc>
-                          <a:spcPts val="2227"/>
-                        </a:lnSpc>
-                        <a:defRPr/>
-                      </a:pPr>
-                      <a:r>
-                        <a:rPr lang="en-US" sz="1591">
-                          <a:solidFill>
-                            <a:srgbClr val="000000"/>
-                          </a:solidFill>
-                          <a:latin typeface="Agrandir"/>
-                          <a:ea typeface="Agrandir"/>
-                          <a:cs typeface="Agrandir"/>
-                          <a:sym typeface="Agrandir"/>
-                        </a:rPr>
-                        <a:t>3</a:t>
-                      </a:r>
-                      <a:endParaRPr lang="en-US" sz="1100"/>
-                    </a:p>
-                  </a:txBody>
-                  <a:tcPr marL="76200" marR="76200" marT="76200" marB="76200" anchor="ctr">
-                    <a:lnL cmpd="sng" algn="ctr" cap="flat" w="19050">
-                      <a:solidFill>
-                        <a:srgbClr val="000000"/>
-                      </a:solidFill>
-                      <a:prstDash val="solid"/>
-                      <a:round/>
-                      <a:headEnd type="none" w="med" len="med"/>
-                      <a:tailEnd type="none" w="med" len="med"/>
-                    </a:lnL>
-                    <a:lnR cmpd="sng" algn="ctr" cap="flat" w="19050">
-                      <a:solidFill>
-                        <a:srgbClr val="000000"/>
-                      </a:solidFill>
-                      <a:prstDash val="solid"/>
-                      <a:round/>
-                      <a:headEnd type="none" w="med" len="med"/>
-                      <a:tailEnd type="none" w="med" len="med"/>
-                    </a:lnR>
-                    <a:lnT cmpd="sng" algn="ctr" cap="flat" w="19050">
-                      <a:solidFill>
-                        <a:srgbClr val="000000"/>
-                      </a:solidFill>
-                      <a:prstDash val="solid"/>
-                      <a:round/>
-                      <a:headEnd type="none" w="med" len="med"/>
-                      <a:tailEnd type="none" w="med" len="med"/>
-                    </a:lnT>
-                    <a:lnB cmpd="sng" algn="ctr" cap="flat" w="19050">
-                      <a:solidFill>
-                        <a:srgbClr val="000000"/>
-                      </a:solidFill>
-                      <a:prstDash val="solid"/>
-                      <a:round/>
-                      <a:headEnd type="none" w="med" len="med"/>
-                      <a:tailEnd type="none" w="med" len="med"/>
-                    </a:lnB>
-                    <a:solidFill>
-                      <a:srgbClr val="FFFFFF"/>
-                    </a:solidFill>
-                  </a:tcPr>
-                </a:tc>
-                <a:tc>
-                  <a:txBody>
-                    <a:bodyPr anchor="t" rtlCol="false"/>
-                    <a:lstStyle/>
-                    <a:p>
-                      <a:pPr algn="ctr">
                         <a:lnSpc>
                           <a:spcPts val="2227"/>
                         </a:lnSpc>
@@ -16644,7 +18000,7 @@
                       <a:endParaRPr lang="en-US" sz="1100"/>
                     </a:p>
                   </a:txBody>
-                  <a:tcPr marL="76200" marR="76200" marT="76200" marB="76200" anchor="ctr">
+                  <a:tcPr marL="66675" marR="66675" marT="66675" marB="66675" anchor="ctr">
                     <a:lnL cmpd="sng" algn="ctr" cap="flat" w="19050">
                       <a:solidFill>
                         <a:srgbClr val="000000"/>
@@ -16724,1006 +18080,7 @@
                       <a:endParaRPr lang="en-US" sz="1100"/>
                     </a:p>
                   </a:txBody>
-                  <a:tcPr marL="76200" marR="76200" marT="76200" marB="76200" anchor="ctr">
-                    <a:lnL cmpd="sng" algn="ctr" cap="flat" w="19050">
-                      <a:solidFill>
-                        <a:srgbClr val="000000"/>
-                      </a:solidFill>
-                      <a:prstDash val="solid"/>
-                      <a:round/>
-                      <a:headEnd type="none" w="med" len="med"/>
-                      <a:tailEnd type="none" w="med" len="med"/>
-                    </a:lnL>
-                    <a:lnR cmpd="sng" algn="ctr" cap="flat" w="19050">
-                      <a:solidFill>
-                        <a:srgbClr val="000000"/>
-                      </a:solidFill>
-                      <a:prstDash val="solid"/>
-                      <a:round/>
-                      <a:headEnd type="none" w="med" len="med"/>
-                      <a:tailEnd type="none" w="med" len="med"/>
-                    </a:lnR>
-                    <a:lnT cmpd="sng" algn="ctr" cap="flat" w="19050">
-                      <a:solidFill>
-                        <a:srgbClr val="000000"/>
-                      </a:solidFill>
-                      <a:prstDash val="solid"/>
-                      <a:round/>
-                      <a:headEnd type="none" w="med" len="med"/>
-                      <a:tailEnd type="none" w="med" len="med"/>
-                    </a:lnT>
-                    <a:lnB cmpd="sng" algn="ctr" cap="flat" w="19050">
-                      <a:solidFill>
-                        <a:srgbClr val="000000"/>
-                      </a:solidFill>
-                      <a:prstDash val="solid"/>
-                      <a:round/>
-                      <a:headEnd type="none" w="med" len="med"/>
-                      <a:tailEnd type="none" w="med" len="med"/>
-                    </a:lnB>
-                    <a:solidFill>
-                      <a:srgbClr val="FFFFFF"/>
-                    </a:solidFill>
-                  </a:tcPr>
-                </a:tc>
-              </a:tr>
-              <a:tr h="1317281">
-                <a:tc>
-                  <a:txBody>
-                    <a:bodyPr anchor="t" rtlCol="false"/>
-                    <a:lstStyle/>
-                    <a:p>
-                      <a:pPr algn="l">
-                        <a:lnSpc>
-                          <a:spcPts val="2227"/>
-                        </a:lnSpc>
-                        <a:defRPr/>
-                      </a:pPr>
-                      <a:r>
-                        <a:rPr lang="en-US" sz="1591" b="true">
-                          <a:solidFill>
-                            <a:srgbClr val="000000"/>
-                          </a:solidFill>
-                          <a:latin typeface="Agrandir Bold"/>
-                          <a:ea typeface="Agrandir Bold"/>
-                          <a:cs typeface="Agrandir Bold"/>
-                          <a:sym typeface="Agrandir Bold"/>
-                        </a:rPr>
-                        <a:t>Diversity &amp; Novelty</a:t>
-                      </a:r>
-                      <a:endParaRPr lang="en-US" sz="1100"/>
-                    </a:p>
-                  </a:txBody>
-                  <a:tcPr marL="76200" marR="76200" marT="76200" marB="76200" anchor="ctr">
-                    <a:lnL cmpd="sng" algn="ctr" cap="flat" w="19050">
-                      <a:solidFill>
-                        <a:srgbClr val="000000"/>
-                      </a:solidFill>
-                      <a:prstDash val="solid"/>
-                      <a:round/>
-                      <a:headEnd type="none" w="med" len="med"/>
-                      <a:tailEnd type="none" w="med" len="med"/>
-                    </a:lnL>
-                    <a:lnR cmpd="sng" algn="ctr" cap="flat" w="19050">
-                      <a:solidFill>
-                        <a:srgbClr val="000000"/>
-                      </a:solidFill>
-                      <a:prstDash val="solid"/>
-                      <a:round/>
-                      <a:headEnd type="none" w="med" len="med"/>
-                      <a:tailEnd type="none" w="med" len="med"/>
-                    </a:lnR>
-                    <a:lnT cmpd="sng" algn="ctr" cap="flat" w="19050">
-                      <a:solidFill>
-                        <a:srgbClr val="000000"/>
-                      </a:solidFill>
-                      <a:prstDash val="solid"/>
-                      <a:round/>
-                      <a:headEnd type="none" w="med" len="med"/>
-                      <a:tailEnd type="none" w="med" len="med"/>
-                    </a:lnT>
-                    <a:lnB cmpd="sng" algn="ctr" cap="flat" w="19050">
-                      <a:solidFill>
-                        <a:srgbClr val="000000"/>
-                      </a:solidFill>
-                      <a:prstDash val="solid"/>
-                      <a:round/>
-                      <a:headEnd type="none" w="med" len="med"/>
-                      <a:tailEnd type="none" w="med" len="med"/>
-                    </a:lnB>
-                    <a:solidFill>
-                      <a:srgbClr val="F1E3E3"/>
-                    </a:solidFill>
-                  </a:tcPr>
-                </a:tc>
-                <a:tc>
-                  <a:txBody>
-                    <a:bodyPr anchor="t" rtlCol="false"/>
-                    <a:lstStyle/>
-                    <a:p>
-                      <a:pPr algn="l">
-                        <a:lnSpc>
-                          <a:spcPts val="2227"/>
-                        </a:lnSpc>
-                        <a:defRPr/>
-                      </a:pPr>
-                      <a:r>
-                        <a:rPr lang="en-US" sz="1591">
-                          <a:solidFill>
-                            <a:srgbClr val="000000"/>
-                          </a:solidFill>
-                          <a:latin typeface="Agrandir"/>
-                          <a:ea typeface="Agrandir"/>
-                          <a:cs typeface="Agrandir"/>
-                          <a:sym typeface="Agrandir"/>
-                        </a:rPr>
-                        <a:t>Examines whether the recommendations remain varied and do not overly favor popular items, thus introducing users to novel and less common options.</a:t>
-                      </a:r>
-                      <a:endParaRPr lang="en-US" sz="1100"/>
-                    </a:p>
-                  </a:txBody>
-                  <a:tcPr marL="76200" marR="76200" marT="76200" marB="76200" anchor="ctr">
-                    <a:lnL cmpd="sng" algn="ctr" cap="flat" w="19050">
-                      <a:solidFill>
-                        <a:srgbClr val="000000"/>
-                      </a:solidFill>
-                      <a:prstDash val="solid"/>
-                      <a:round/>
-                      <a:headEnd type="none" w="med" len="med"/>
-                      <a:tailEnd type="none" w="med" len="med"/>
-                    </a:lnL>
-                    <a:lnR cmpd="sng" algn="ctr" cap="flat" w="19050">
-                      <a:solidFill>
-                        <a:srgbClr val="000000"/>
-                      </a:solidFill>
-                      <a:prstDash val="solid"/>
-                      <a:round/>
-                      <a:headEnd type="none" w="med" len="med"/>
-                      <a:tailEnd type="none" w="med" len="med"/>
-                    </a:lnR>
-                    <a:lnT cmpd="sng" algn="ctr" cap="flat" w="19050">
-                      <a:solidFill>
-                        <a:srgbClr val="000000"/>
-                      </a:solidFill>
-                      <a:prstDash val="solid"/>
-                      <a:round/>
-                      <a:headEnd type="none" w="med" len="med"/>
-                      <a:tailEnd type="none" w="med" len="med"/>
-                    </a:lnT>
-                    <a:lnB cmpd="sng" algn="ctr" cap="flat" w="19050">
-                      <a:solidFill>
-                        <a:srgbClr val="000000"/>
-                      </a:solidFill>
-                      <a:prstDash val="solid"/>
-                      <a:round/>
-                      <a:headEnd type="none" w="med" len="med"/>
-                      <a:tailEnd type="none" w="med" len="med"/>
-                    </a:lnB>
-                    <a:solidFill>
-                      <a:srgbClr val="FFFFFF"/>
-                    </a:solidFill>
-                  </a:tcPr>
-                </a:tc>
-                <a:tc>
-                  <a:txBody>
-                    <a:bodyPr anchor="t" rtlCol="false"/>
-                    <a:lstStyle/>
-                    <a:p>
-                      <a:pPr algn="l">
-                        <a:lnSpc>
-                          <a:spcPts val="2227"/>
-                        </a:lnSpc>
-                        <a:defRPr/>
-                      </a:pPr>
-                      <a:r>
-                        <a:rPr lang="en-US" sz="1591">
-                          <a:solidFill>
-                            <a:srgbClr val="000000"/>
-                          </a:solidFill>
-                          <a:latin typeface="Agrandir"/>
-                          <a:ea typeface="Agrandir"/>
-                          <a:cs typeface="Agrandir"/>
-                          <a:sym typeface="Agrandir"/>
-                        </a:rPr>
-                        <a:t>Diversity index or entropy ≥ 0.75 in</a:t>
-                      </a:r>
-                      <a:endParaRPr lang="en-US" sz="1100"/>
-                    </a:p>
-                    <a:p>
-                      <a:pPr algn="l">
-                        <a:lnSpc>
-                          <a:spcPts val="2227"/>
-                        </a:lnSpc>
-                      </a:pPr>
-                      <a:r>
-                        <a:rPr lang="en-US" sz="1591">
-                          <a:solidFill>
-                            <a:srgbClr val="000000"/>
-                          </a:solidFill>
-                          <a:latin typeface="Agrandir"/>
-                          <a:ea typeface="Agrandir"/>
-                          <a:cs typeface="Agrandir"/>
-                          <a:sym typeface="Agrandir"/>
-                        </a:rPr>
-                        <a:t>  recommendation outputs</a:t>
-                      </a:r>
-                    </a:p>
-                  </a:txBody>
-                  <a:tcPr marL="76200" marR="76200" marT="76200" marB="76200" anchor="ctr">
-                    <a:lnL cmpd="sng" algn="ctr" cap="flat" w="19050">
-                      <a:solidFill>
-                        <a:srgbClr val="000000"/>
-                      </a:solidFill>
-                      <a:prstDash val="solid"/>
-                      <a:round/>
-                      <a:headEnd type="none" w="med" len="med"/>
-                      <a:tailEnd type="none" w="med" len="med"/>
-                    </a:lnL>
-                    <a:lnR cmpd="sng" algn="ctr" cap="flat" w="19050">
-                      <a:solidFill>
-                        <a:srgbClr val="000000"/>
-                      </a:solidFill>
-                      <a:prstDash val="solid"/>
-                      <a:round/>
-                      <a:headEnd type="none" w="med" len="med"/>
-                      <a:tailEnd type="none" w="med" len="med"/>
-                    </a:lnR>
-                    <a:lnT cmpd="sng" algn="ctr" cap="flat" w="19050">
-                      <a:solidFill>
-                        <a:srgbClr val="000000"/>
-                      </a:solidFill>
-                      <a:prstDash val="solid"/>
-                      <a:round/>
-                      <a:headEnd type="none" w="med" len="med"/>
-                      <a:tailEnd type="none" w="med" len="med"/>
-                    </a:lnT>
-                    <a:lnB cmpd="sng" algn="ctr" cap="flat" w="19050">
-                      <a:solidFill>
-                        <a:srgbClr val="000000"/>
-                      </a:solidFill>
-                      <a:prstDash val="solid"/>
-                      <a:round/>
-                      <a:headEnd type="none" w="med" len="med"/>
-                      <a:tailEnd type="none" w="med" len="med"/>
-                    </a:lnB>
-                    <a:solidFill>
-                      <a:srgbClr val="FFFFFF"/>
-                    </a:solidFill>
-                  </a:tcPr>
-                </a:tc>
-                <a:tc>
-                  <a:txBody>
-                    <a:bodyPr anchor="t" rtlCol="false"/>
-                    <a:lstStyle/>
-                    <a:p>
-                      <a:pPr algn="ctr">
-                        <a:lnSpc>
-                          <a:spcPts val="2227"/>
-                        </a:lnSpc>
-                        <a:defRPr/>
-                      </a:pPr>
-                      <a:r>
-                        <a:rPr lang="en-US" sz="1591">
-                          <a:solidFill>
-                            <a:srgbClr val="000000"/>
-                          </a:solidFill>
-                          <a:latin typeface="Agrandir"/>
-                          <a:ea typeface="Agrandir"/>
-                          <a:cs typeface="Agrandir"/>
-                          <a:sym typeface="Agrandir"/>
-                        </a:rPr>
-                        <a:t>2</a:t>
-                      </a:r>
-                      <a:endParaRPr lang="en-US" sz="1100"/>
-                    </a:p>
-                  </a:txBody>
-                  <a:tcPr marL="76200" marR="76200" marT="76200" marB="76200" anchor="ctr">
-                    <a:lnL cmpd="sng" algn="ctr" cap="flat" w="19050">
-                      <a:solidFill>
-                        <a:srgbClr val="000000"/>
-                      </a:solidFill>
-                      <a:prstDash val="solid"/>
-                      <a:round/>
-                      <a:headEnd type="none" w="med" len="med"/>
-                      <a:tailEnd type="none" w="med" len="med"/>
-                    </a:lnL>
-                    <a:lnR cmpd="sng" algn="ctr" cap="flat" w="19050">
-                      <a:solidFill>
-                        <a:srgbClr val="000000"/>
-                      </a:solidFill>
-                      <a:prstDash val="solid"/>
-                      <a:round/>
-                      <a:headEnd type="none" w="med" len="med"/>
-                      <a:tailEnd type="none" w="med" len="med"/>
-                    </a:lnR>
-                    <a:lnT cmpd="sng" algn="ctr" cap="flat" w="19050">
-                      <a:solidFill>
-                        <a:srgbClr val="000000"/>
-                      </a:solidFill>
-                      <a:prstDash val="solid"/>
-                      <a:round/>
-                      <a:headEnd type="none" w="med" len="med"/>
-                      <a:tailEnd type="none" w="med" len="med"/>
-                    </a:lnT>
-                    <a:lnB cmpd="sng" algn="ctr" cap="flat" w="19050">
-                      <a:solidFill>
-                        <a:srgbClr val="000000"/>
-                      </a:solidFill>
-                      <a:prstDash val="solid"/>
-                      <a:round/>
-                      <a:headEnd type="none" w="med" len="med"/>
-                      <a:tailEnd type="none" w="med" len="med"/>
-                    </a:lnB>
-                    <a:solidFill>
-                      <a:srgbClr val="FFFFFF"/>
-                    </a:solidFill>
-                  </a:tcPr>
-                </a:tc>
-                <a:tc>
-                  <a:txBody>
-                    <a:bodyPr anchor="t" rtlCol="false"/>
-                    <a:lstStyle/>
-                    <a:p>
-                      <a:pPr algn="ctr">
-                        <a:lnSpc>
-                          <a:spcPts val="2227"/>
-                        </a:lnSpc>
-                        <a:defRPr/>
-                      </a:pPr>
-                      <a:r>
-                        <a:rPr lang="en-US" sz="1591">
-                          <a:solidFill>
-                            <a:srgbClr val="000000"/>
-                          </a:solidFill>
-                          <a:latin typeface="Agrandir"/>
-                          <a:ea typeface="Agrandir"/>
-                          <a:cs typeface="Agrandir"/>
-                          <a:sym typeface="Agrandir"/>
-                        </a:rPr>
-                        <a:t>2</a:t>
-                      </a:r>
-                      <a:endParaRPr lang="en-US" sz="1100"/>
-                    </a:p>
-                  </a:txBody>
-                  <a:tcPr marL="76200" marR="76200" marT="76200" marB="76200" anchor="ctr">
-                    <a:lnL cmpd="sng" algn="ctr" cap="flat" w="19050">
-                      <a:solidFill>
-                        <a:srgbClr val="000000"/>
-                      </a:solidFill>
-                      <a:prstDash val="solid"/>
-                      <a:round/>
-                      <a:headEnd type="none" w="med" len="med"/>
-                      <a:tailEnd type="none" w="med" len="med"/>
-                    </a:lnL>
-                    <a:lnR cmpd="sng" algn="ctr" cap="flat" w="19050">
-                      <a:solidFill>
-                        <a:srgbClr val="000000"/>
-                      </a:solidFill>
-                      <a:prstDash val="solid"/>
-                      <a:round/>
-                      <a:headEnd type="none" w="med" len="med"/>
-                      <a:tailEnd type="none" w="med" len="med"/>
-                    </a:lnR>
-                    <a:lnT cmpd="sng" algn="ctr" cap="flat" w="19050">
-                      <a:solidFill>
-                        <a:srgbClr val="000000"/>
-                      </a:solidFill>
-                      <a:prstDash val="solid"/>
-                      <a:round/>
-                      <a:headEnd type="none" w="med" len="med"/>
-                      <a:tailEnd type="none" w="med" len="med"/>
-                    </a:lnT>
-                    <a:lnB cmpd="sng" algn="ctr" cap="flat" w="19050">
-                      <a:solidFill>
-                        <a:srgbClr val="000000"/>
-                      </a:solidFill>
-                      <a:prstDash val="solid"/>
-                      <a:round/>
-                      <a:headEnd type="none" w="med" len="med"/>
-                      <a:tailEnd type="none" w="med" len="med"/>
-                    </a:lnB>
-                    <a:solidFill>
-                      <a:srgbClr val="FFFFFF"/>
-                    </a:solidFill>
-                  </a:tcPr>
-                </a:tc>
-                <a:tc>
-                  <a:txBody>
-                    <a:bodyPr anchor="t" rtlCol="false"/>
-                    <a:lstStyle/>
-                    <a:p>
-                      <a:pPr algn="ctr">
-                        <a:lnSpc>
-                          <a:spcPts val="2227"/>
-                        </a:lnSpc>
-                        <a:defRPr/>
-                      </a:pPr>
-                      <a:r>
-                        <a:rPr lang="en-US" sz="1591">
-                          <a:solidFill>
-                            <a:srgbClr val="000000"/>
-                          </a:solidFill>
-                          <a:latin typeface="Agrandir"/>
-                          <a:ea typeface="Agrandir"/>
-                          <a:cs typeface="Agrandir"/>
-                          <a:sym typeface="Agrandir"/>
-                        </a:rPr>
-                        <a:t>5</a:t>
-                      </a:r>
-                      <a:endParaRPr lang="en-US" sz="1100"/>
-                    </a:p>
-                  </a:txBody>
-                  <a:tcPr marL="76200" marR="76200" marT="76200" marB="76200" anchor="ctr">
-                    <a:lnL cmpd="sng" algn="ctr" cap="flat" w="19050">
-                      <a:solidFill>
-                        <a:srgbClr val="000000"/>
-                      </a:solidFill>
-                      <a:prstDash val="solid"/>
-                      <a:round/>
-                      <a:headEnd type="none" w="med" len="med"/>
-                      <a:tailEnd type="none" w="med" len="med"/>
-                    </a:lnL>
-                    <a:lnR cmpd="sng" algn="ctr" cap="flat" w="19050">
-                      <a:solidFill>
-                        <a:srgbClr val="000000"/>
-                      </a:solidFill>
-                      <a:prstDash val="solid"/>
-                      <a:round/>
-                      <a:headEnd type="none" w="med" len="med"/>
-                      <a:tailEnd type="none" w="med" len="med"/>
-                    </a:lnR>
-                    <a:lnT cmpd="sng" algn="ctr" cap="flat" w="19050">
-                      <a:solidFill>
-                        <a:srgbClr val="000000"/>
-                      </a:solidFill>
-                      <a:prstDash val="solid"/>
-                      <a:round/>
-                      <a:headEnd type="none" w="med" len="med"/>
-                      <a:tailEnd type="none" w="med" len="med"/>
-                    </a:lnT>
-                    <a:lnB cmpd="sng" algn="ctr" cap="flat" w="19050">
-                      <a:solidFill>
-                        <a:srgbClr val="000000"/>
-                      </a:solidFill>
-                      <a:prstDash val="solid"/>
-                      <a:round/>
-                      <a:headEnd type="none" w="med" len="med"/>
-                      <a:tailEnd type="none" w="med" len="med"/>
-                    </a:lnB>
-                    <a:solidFill>
-                      <a:srgbClr val="FFFFFF"/>
-                    </a:solidFill>
-                  </a:tcPr>
-                </a:tc>
-                <a:tc>
-                  <a:txBody>
-                    <a:bodyPr anchor="t" rtlCol="false"/>
-                    <a:lstStyle/>
-                    <a:p>
-                      <a:pPr algn="l">
-                        <a:lnSpc>
-                          <a:spcPts val="2227"/>
-                        </a:lnSpc>
-                        <a:defRPr/>
-                      </a:pPr>
-                      <a:r>
-                        <a:rPr lang="en-US" sz="1591">
-                          <a:solidFill>
-                            <a:srgbClr val="000000"/>
-                          </a:solidFill>
-                          <a:latin typeface="Agrandir"/>
-                          <a:ea typeface="Agrandir"/>
-                          <a:cs typeface="Agrandir"/>
-                          <a:sym typeface="Agrandir"/>
-                        </a:rPr>
-                        <a:t>(2 + 2) × 5 = </a:t>
-                      </a:r>
-                      <a:r>
-                        <a:rPr lang="en-US" sz="1591" b="true">
-                          <a:solidFill>
-                            <a:srgbClr val="000000"/>
-                          </a:solidFill>
-                          <a:latin typeface="Agrandir Bold"/>
-                          <a:ea typeface="Agrandir Bold"/>
-                          <a:cs typeface="Agrandir Bold"/>
-                          <a:sym typeface="Agrandir Bold"/>
-                        </a:rPr>
-                        <a:t>20</a:t>
-                      </a:r>
-                      <a:endParaRPr lang="en-US" sz="1100"/>
-                    </a:p>
-                  </a:txBody>
-                  <a:tcPr marL="76200" marR="76200" marT="76200" marB="76200" anchor="ctr">
-                    <a:lnL cmpd="sng" algn="ctr" cap="flat" w="19050">
-                      <a:solidFill>
-                        <a:srgbClr val="000000"/>
-                      </a:solidFill>
-                      <a:prstDash val="solid"/>
-                      <a:round/>
-                      <a:headEnd type="none" w="med" len="med"/>
-                      <a:tailEnd type="none" w="med" len="med"/>
-                    </a:lnL>
-                    <a:lnR cmpd="sng" algn="ctr" cap="flat" w="19050">
-                      <a:solidFill>
-                        <a:srgbClr val="000000"/>
-                      </a:solidFill>
-                      <a:prstDash val="solid"/>
-                      <a:round/>
-                      <a:headEnd type="none" w="med" len="med"/>
-                      <a:tailEnd type="none" w="med" len="med"/>
-                    </a:lnR>
-                    <a:lnT cmpd="sng" algn="ctr" cap="flat" w="19050">
-                      <a:solidFill>
-                        <a:srgbClr val="000000"/>
-                      </a:solidFill>
-                      <a:prstDash val="solid"/>
-                      <a:round/>
-                      <a:headEnd type="none" w="med" len="med"/>
-                      <a:tailEnd type="none" w="med" len="med"/>
-                    </a:lnT>
-                    <a:lnB cmpd="sng" algn="ctr" cap="flat" w="19050">
-                      <a:solidFill>
-                        <a:srgbClr val="000000"/>
-                      </a:solidFill>
-                      <a:prstDash val="solid"/>
-                      <a:round/>
-                      <a:headEnd type="none" w="med" len="med"/>
-                      <a:tailEnd type="none" w="med" len="med"/>
-                    </a:lnB>
-                    <a:solidFill>
-                      <a:srgbClr val="FFFFFF"/>
-                    </a:solidFill>
-                  </a:tcPr>
-                </a:tc>
-              </a:tr>
-              <a:tr h="1308869">
-                <a:tc>
-                  <a:txBody>
-                    <a:bodyPr anchor="t" rtlCol="false"/>
-                    <a:lstStyle/>
-                    <a:p>
-                      <a:pPr algn="l">
-                        <a:lnSpc>
-                          <a:spcPts val="2227"/>
-                        </a:lnSpc>
-                        <a:defRPr/>
-                      </a:pPr>
-                      <a:r>
-                        <a:rPr lang="en-US" sz="1591" b="true">
-                          <a:solidFill>
-                            <a:srgbClr val="000000"/>
-                          </a:solidFill>
-                          <a:latin typeface="Agrandir Bold"/>
-                          <a:ea typeface="Agrandir Bold"/>
-                          <a:cs typeface="Agrandir Bold"/>
-                          <a:sym typeface="Agrandir Bold"/>
-                        </a:rPr>
-                        <a:t>Explainability</a:t>
-                      </a:r>
-                      <a:endParaRPr lang="en-US" sz="1100"/>
-                    </a:p>
-                  </a:txBody>
-                  <a:tcPr marL="76200" marR="76200" marT="76200" marB="76200" anchor="ctr">
-                    <a:lnL cmpd="sng" algn="ctr" cap="flat" w="19050">
-                      <a:solidFill>
-                        <a:srgbClr val="000000"/>
-                      </a:solidFill>
-                      <a:prstDash val="solid"/>
-                      <a:round/>
-                      <a:headEnd type="none" w="med" len="med"/>
-                      <a:tailEnd type="none" w="med" len="med"/>
-                    </a:lnL>
-                    <a:lnR cmpd="sng" algn="ctr" cap="flat" w="19050">
-                      <a:solidFill>
-                        <a:srgbClr val="000000"/>
-                      </a:solidFill>
-                      <a:prstDash val="solid"/>
-                      <a:round/>
-                      <a:headEnd type="none" w="med" len="med"/>
-                      <a:tailEnd type="none" w="med" len="med"/>
-                    </a:lnR>
-                    <a:lnT cmpd="sng" algn="ctr" cap="flat" w="19050">
-                      <a:solidFill>
-                        <a:srgbClr val="000000"/>
-                      </a:solidFill>
-                      <a:prstDash val="solid"/>
-                      <a:round/>
-                      <a:headEnd type="none" w="med" len="med"/>
-                      <a:tailEnd type="none" w="med" len="med"/>
-                    </a:lnT>
-                    <a:lnB cmpd="sng" algn="ctr" cap="flat" w="19050">
-                      <a:solidFill>
-                        <a:srgbClr val="000000"/>
-                      </a:solidFill>
-                      <a:prstDash val="solid"/>
-                      <a:round/>
-                      <a:headEnd type="none" w="med" len="med"/>
-                      <a:tailEnd type="none" w="med" len="med"/>
-                    </a:lnB>
-                    <a:solidFill>
-                      <a:srgbClr val="F1E3E3"/>
-                    </a:solidFill>
-                  </a:tcPr>
-                </a:tc>
-                <a:tc>
-                  <a:txBody>
-                    <a:bodyPr anchor="t" rtlCol="false"/>
-                    <a:lstStyle/>
-                    <a:p>
-                      <a:pPr algn="l">
-                        <a:lnSpc>
-                          <a:spcPts val="2227"/>
-                        </a:lnSpc>
-                        <a:defRPr/>
-                      </a:pPr>
-                      <a:r>
-                        <a:rPr lang="en-US" sz="1591">
-                          <a:solidFill>
-                            <a:srgbClr val="000000"/>
-                          </a:solidFill>
-                          <a:latin typeface="Agrandir"/>
-                          <a:ea typeface="Agrandir"/>
-                          <a:cs typeface="Agrandir"/>
-                          <a:sym typeface="Agrandir"/>
-                        </a:rPr>
-                        <a:t>Measures how transparently the system communicates the rationale behind its recommendations, thereby enhancing user trust and understanding.</a:t>
-                      </a:r>
-                      <a:endParaRPr lang="en-US" sz="1100"/>
-                    </a:p>
-                  </a:txBody>
-                  <a:tcPr marL="76200" marR="76200" marT="76200" marB="76200" anchor="ctr">
-                    <a:lnL cmpd="sng" algn="ctr" cap="flat" w="19050">
-                      <a:solidFill>
-                        <a:srgbClr val="000000"/>
-                      </a:solidFill>
-                      <a:prstDash val="solid"/>
-                      <a:round/>
-                      <a:headEnd type="none" w="med" len="med"/>
-                      <a:tailEnd type="none" w="med" len="med"/>
-                    </a:lnL>
-                    <a:lnR cmpd="sng" algn="ctr" cap="flat" w="19050">
-                      <a:solidFill>
-                        <a:srgbClr val="000000"/>
-                      </a:solidFill>
-                      <a:prstDash val="solid"/>
-                      <a:round/>
-                      <a:headEnd type="none" w="med" len="med"/>
-                      <a:tailEnd type="none" w="med" len="med"/>
-                    </a:lnR>
-                    <a:lnT cmpd="sng" algn="ctr" cap="flat" w="19050">
-                      <a:solidFill>
-                        <a:srgbClr val="000000"/>
-                      </a:solidFill>
-                      <a:prstDash val="solid"/>
-                      <a:round/>
-                      <a:headEnd type="none" w="med" len="med"/>
-                      <a:tailEnd type="none" w="med" len="med"/>
-                    </a:lnT>
-                    <a:lnB cmpd="sng" algn="ctr" cap="flat" w="19050">
-                      <a:solidFill>
-                        <a:srgbClr val="000000"/>
-                      </a:solidFill>
-                      <a:prstDash val="solid"/>
-                      <a:round/>
-                      <a:headEnd type="none" w="med" len="med"/>
-                      <a:tailEnd type="none" w="med" len="med"/>
-                    </a:lnB>
-                    <a:solidFill>
-                      <a:srgbClr val="FFFFFF"/>
-                    </a:solidFill>
-                  </a:tcPr>
-                </a:tc>
-                <a:tc>
-                  <a:txBody>
-                    <a:bodyPr anchor="t" rtlCol="false"/>
-                    <a:lstStyle/>
-                    <a:p>
-                      <a:pPr algn="l">
-                        <a:lnSpc>
-                          <a:spcPts val="2227"/>
-                        </a:lnSpc>
-                        <a:defRPr/>
-                      </a:pPr>
-                      <a:r>
-                        <a:rPr lang="en-US" sz="1591">
-                          <a:solidFill>
-                            <a:srgbClr val="000000"/>
-                          </a:solidFill>
-                          <a:latin typeface="Agrandir"/>
-                          <a:ea typeface="Agrandir"/>
-                          <a:cs typeface="Agrandir"/>
-                          <a:sym typeface="Agrandir"/>
-                        </a:rPr>
-                        <a:t>User survey ratings for explanation ≥ 4/5</a:t>
-                      </a:r>
-                      <a:endParaRPr lang="en-US" sz="1100"/>
-                    </a:p>
-                  </a:txBody>
-                  <a:tcPr marL="76200" marR="76200" marT="76200" marB="76200" anchor="ctr">
-                    <a:lnL cmpd="sng" algn="ctr" cap="flat" w="19050">
-                      <a:solidFill>
-                        <a:srgbClr val="000000"/>
-                      </a:solidFill>
-                      <a:prstDash val="solid"/>
-                      <a:round/>
-                      <a:headEnd type="none" w="med" len="med"/>
-                      <a:tailEnd type="none" w="med" len="med"/>
-                    </a:lnL>
-                    <a:lnR cmpd="sng" algn="ctr" cap="flat" w="19050">
-                      <a:solidFill>
-                        <a:srgbClr val="000000"/>
-                      </a:solidFill>
-                      <a:prstDash val="solid"/>
-                      <a:round/>
-                      <a:headEnd type="none" w="med" len="med"/>
-                      <a:tailEnd type="none" w="med" len="med"/>
-                    </a:lnR>
-                    <a:lnT cmpd="sng" algn="ctr" cap="flat" w="19050">
-                      <a:solidFill>
-                        <a:srgbClr val="000000"/>
-                      </a:solidFill>
-                      <a:prstDash val="solid"/>
-                      <a:round/>
-                      <a:headEnd type="none" w="med" len="med"/>
-                      <a:tailEnd type="none" w="med" len="med"/>
-                    </a:lnT>
-                    <a:lnB cmpd="sng" algn="ctr" cap="flat" w="19050">
-                      <a:solidFill>
-                        <a:srgbClr val="000000"/>
-                      </a:solidFill>
-                      <a:prstDash val="solid"/>
-                      <a:round/>
-                      <a:headEnd type="none" w="med" len="med"/>
-                      <a:tailEnd type="none" w="med" len="med"/>
-                    </a:lnB>
-                    <a:solidFill>
-                      <a:srgbClr val="FFFFFF"/>
-                    </a:solidFill>
-                  </a:tcPr>
-                </a:tc>
-                <a:tc>
-                  <a:txBody>
-                    <a:bodyPr anchor="t" rtlCol="false"/>
-                    <a:lstStyle/>
-                    <a:p>
-                      <a:pPr algn="ctr">
-                        <a:lnSpc>
-                          <a:spcPts val="2227"/>
-                        </a:lnSpc>
-                        <a:defRPr/>
-                      </a:pPr>
-                      <a:r>
-                        <a:rPr lang="en-US" sz="1591">
-                          <a:solidFill>
-                            <a:srgbClr val="000000"/>
-                          </a:solidFill>
-                          <a:latin typeface="Agrandir"/>
-                          <a:ea typeface="Agrandir"/>
-                          <a:cs typeface="Agrandir"/>
-                          <a:sym typeface="Agrandir"/>
-                        </a:rPr>
-                        <a:t>2</a:t>
-                      </a:r>
-                      <a:endParaRPr lang="en-US" sz="1100"/>
-                    </a:p>
-                  </a:txBody>
-                  <a:tcPr marL="76200" marR="76200" marT="76200" marB="76200" anchor="ctr">
-                    <a:lnL cmpd="sng" algn="ctr" cap="flat" w="19050">
-                      <a:solidFill>
-                        <a:srgbClr val="000000"/>
-                      </a:solidFill>
-                      <a:prstDash val="solid"/>
-                      <a:round/>
-                      <a:headEnd type="none" w="med" len="med"/>
-                      <a:tailEnd type="none" w="med" len="med"/>
-                    </a:lnL>
-                    <a:lnR cmpd="sng" algn="ctr" cap="flat" w="19050">
-                      <a:solidFill>
-                        <a:srgbClr val="000000"/>
-                      </a:solidFill>
-                      <a:prstDash val="solid"/>
-                      <a:round/>
-                      <a:headEnd type="none" w="med" len="med"/>
-                      <a:tailEnd type="none" w="med" len="med"/>
-                    </a:lnR>
-                    <a:lnT cmpd="sng" algn="ctr" cap="flat" w="19050">
-                      <a:solidFill>
-                        <a:srgbClr val="000000"/>
-                      </a:solidFill>
-                      <a:prstDash val="solid"/>
-                      <a:round/>
-                      <a:headEnd type="none" w="med" len="med"/>
-                      <a:tailEnd type="none" w="med" len="med"/>
-                    </a:lnT>
-                    <a:lnB cmpd="sng" algn="ctr" cap="flat" w="19050">
-                      <a:solidFill>
-                        <a:srgbClr val="000000"/>
-                      </a:solidFill>
-                      <a:prstDash val="solid"/>
-                      <a:round/>
-                      <a:headEnd type="none" w="med" len="med"/>
-                      <a:tailEnd type="none" w="med" len="med"/>
-                    </a:lnB>
-                    <a:solidFill>
-                      <a:srgbClr val="FFFFFF"/>
-                    </a:solidFill>
-                  </a:tcPr>
-                </a:tc>
-                <a:tc>
-                  <a:txBody>
-                    <a:bodyPr anchor="t" rtlCol="false"/>
-                    <a:lstStyle/>
-                    <a:p>
-                      <a:pPr algn="ctr">
-                        <a:lnSpc>
-                          <a:spcPts val="2227"/>
-                        </a:lnSpc>
-                        <a:defRPr/>
-                      </a:pPr>
-                      <a:r>
-                        <a:rPr lang="en-US" sz="1591">
-                          <a:solidFill>
-                            <a:srgbClr val="000000"/>
-                          </a:solidFill>
-                          <a:latin typeface="Agrandir"/>
-                          <a:ea typeface="Agrandir"/>
-                          <a:cs typeface="Agrandir"/>
-                          <a:sym typeface="Agrandir"/>
-                        </a:rPr>
-                        <a:t>2</a:t>
-                      </a:r>
-                      <a:endParaRPr lang="en-US" sz="1100"/>
-                    </a:p>
-                  </a:txBody>
-                  <a:tcPr marL="76200" marR="76200" marT="76200" marB="76200" anchor="ctr">
-                    <a:lnL cmpd="sng" algn="ctr" cap="flat" w="19050">
-                      <a:solidFill>
-                        <a:srgbClr val="000000"/>
-                      </a:solidFill>
-                      <a:prstDash val="solid"/>
-                      <a:round/>
-                      <a:headEnd type="none" w="med" len="med"/>
-                      <a:tailEnd type="none" w="med" len="med"/>
-                    </a:lnL>
-                    <a:lnR cmpd="sng" algn="ctr" cap="flat" w="19050">
-                      <a:solidFill>
-                        <a:srgbClr val="000000"/>
-                      </a:solidFill>
-                      <a:prstDash val="solid"/>
-                      <a:round/>
-                      <a:headEnd type="none" w="med" len="med"/>
-                      <a:tailEnd type="none" w="med" len="med"/>
-                    </a:lnR>
-                    <a:lnT cmpd="sng" algn="ctr" cap="flat" w="19050">
-                      <a:solidFill>
-                        <a:srgbClr val="000000"/>
-                      </a:solidFill>
-                      <a:prstDash val="solid"/>
-                      <a:round/>
-                      <a:headEnd type="none" w="med" len="med"/>
-                      <a:tailEnd type="none" w="med" len="med"/>
-                    </a:lnT>
-                    <a:lnB cmpd="sng" algn="ctr" cap="flat" w="19050">
-                      <a:solidFill>
-                        <a:srgbClr val="000000"/>
-                      </a:solidFill>
-                      <a:prstDash val="solid"/>
-                      <a:round/>
-                      <a:headEnd type="none" w="med" len="med"/>
-                      <a:tailEnd type="none" w="med" len="med"/>
-                    </a:lnB>
-                    <a:solidFill>
-                      <a:srgbClr val="FFFFFF"/>
-                    </a:solidFill>
-                  </a:tcPr>
-                </a:tc>
-                <a:tc>
-                  <a:txBody>
-                    <a:bodyPr anchor="t" rtlCol="false"/>
-                    <a:lstStyle/>
-                    <a:p>
-                      <a:pPr algn="ctr">
-                        <a:lnSpc>
-                          <a:spcPts val="2227"/>
-                        </a:lnSpc>
-                        <a:defRPr/>
-                      </a:pPr>
-                      <a:r>
-                        <a:rPr lang="en-US" sz="1591">
-                          <a:solidFill>
-                            <a:srgbClr val="000000"/>
-                          </a:solidFill>
-                          <a:latin typeface="Agrandir"/>
-                          <a:ea typeface="Agrandir"/>
-                          <a:cs typeface="Agrandir"/>
-                          <a:sym typeface="Agrandir"/>
-                        </a:rPr>
-                        <a:t>5</a:t>
-                      </a:r>
-                      <a:endParaRPr lang="en-US" sz="1100"/>
-                    </a:p>
-                  </a:txBody>
-                  <a:tcPr marL="76200" marR="76200" marT="76200" marB="76200" anchor="ctr">
-                    <a:lnL cmpd="sng" algn="ctr" cap="flat" w="19050">
-                      <a:solidFill>
-                        <a:srgbClr val="000000"/>
-                      </a:solidFill>
-                      <a:prstDash val="solid"/>
-                      <a:round/>
-                      <a:headEnd type="none" w="med" len="med"/>
-                      <a:tailEnd type="none" w="med" len="med"/>
-                    </a:lnL>
-                    <a:lnR cmpd="sng" algn="ctr" cap="flat" w="19050">
-                      <a:solidFill>
-                        <a:srgbClr val="000000"/>
-                      </a:solidFill>
-                      <a:prstDash val="solid"/>
-                      <a:round/>
-                      <a:headEnd type="none" w="med" len="med"/>
-                      <a:tailEnd type="none" w="med" len="med"/>
-                    </a:lnR>
-                    <a:lnT cmpd="sng" algn="ctr" cap="flat" w="19050">
-                      <a:solidFill>
-                        <a:srgbClr val="000000"/>
-                      </a:solidFill>
-                      <a:prstDash val="solid"/>
-                      <a:round/>
-                      <a:headEnd type="none" w="med" len="med"/>
-                      <a:tailEnd type="none" w="med" len="med"/>
-                    </a:lnT>
-                    <a:lnB cmpd="sng" algn="ctr" cap="flat" w="19050">
-                      <a:solidFill>
-                        <a:srgbClr val="000000"/>
-                      </a:solidFill>
-                      <a:prstDash val="solid"/>
-                      <a:round/>
-                      <a:headEnd type="none" w="med" len="med"/>
-                      <a:tailEnd type="none" w="med" len="med"/>
-                    </a:lnB>
-                    <a:solidFill>
-                      <a:srgbClr val="FFFFFF"/>
-                    </a:solidFill>
-                  </a:tcPr>
-                </a:tc>
-                <a:tc>
-                  <a:txBody>
-                    <a:bodyPr anchor="t" rtlCol="false"/>
-                    <a:lstStyle/>
-                    <a:p>
-                      <a:pPr algn="l">
-                        <a:lnSpc>
-                          <a:spcPts val="2227"/>
-                        </a:lnSpc>
-                        <a:defRPr/>
-                      </a:pPr>
-                      <a:r>
-                        <a:rPr lang="en-US" sz="1591">
-                          <a:solidFill>
-                            <a:srgbClr val="000000"/>
-                          </a:solidFill>
-                          <a:latin typeface="Agrandir"/>
-                          <a:ea typeface="Agrandir"/>
-                          <a:cs typeface="Agrandir"/>
-                          <a:sym typeface="Agrandir"/>
-                        </a:rPr>
-                        <a:t>(2 + 2) × 5 = </a:t>
-                      </a:r>
-                      <a:r>
-                        <a:rPr lang="en-US" sz="1591" b="true">
-                          <a:solidFill>
-                            <a:srgbClr val="000000"/>
-                          </a:solidFill>
-                          <a:latin typeface="Agrandir Bold"/>
-                          <a:ea typeface="Agrandir Bold"/>
-                          <a:cs typeface="Agrandir Bold"/>
-                          <a:sym typeface="Agrandir Bold"/>
-                        </a:rPr>
-                        <a:t>20</a:t>
-                      </a:r>
-                      <a:endParaRPr lang="en-US" sz="1100"/>
-                    </a:p>
-                  </a:txBody>
-                  <a:tcPr marL="76200" marR="76200" marT="76200" marB="76200" anchor="ctr">
+                  <a:tcPr marL="66675" marR="66675" marT="66675" marB="66675" anchor="ctr">
                     <a:lnL cmpd="sng" algn="ctr" cap="flat" w="19050">
                       <a:solidFill>
                         <a:srgbClr val="000000"/>

</xml_diff>